<commit_message>
changing COBRA doc repository
</commit_message>
<xml_diff>
--- a/slides/python_biopython_Multiple_alignment.pptx
+++ b/slides/python_biopython_Multiple_alignment.pptx
@@ -326,7 +326,7 @@
           <a:p>
             <a:fld id="{5EB47243-285B-2741-8C7D-C88258D9CCFA}" type="datetimeFigureOut">
               <a:rPr lang="fr-FR" smtClean="0"/>
-              <a:t>06/11/16</a:t>
+              <a:t>08/11/16</a:t>
             </a:fld>
             <a:endParaRPr lang="fr-FR"/>
           </a:p>
@@ -492,7 +492,7 @@
           <a:p>
             <a:fld id="{7D088D39-B4EA-D24B-B9C3-6A64886EABE2}" type="datetimeFigureOut">
               <a:rPr lang="fr-FR" smtClean="0"/>
-              <a:t>06/11/16</a:t>
+              <a:t>08/11/16</a:t>
             </a:fld>
             <a:endParaRPr lang="fr-FR"/>
           </a:p>
@@ -1886,7 +1886,7 @@
           <a:p>
             <a:fld id="{751463B9-2A29-154C-A5AC-383AEA094CA9}" type="datetime1">
               <a:rPr lang="fr-FR" smtClean="0"/>
-              <a:t>06/11/16</a:t>
+              <a:t>08/11/16</a:t>
             </a:fld>
             <a:endParaRPr lang="fr-FR" dirty="0"/>
           </a:p>
@@ -2387,7 +2387,7 @@
           <a:p>
             <a:fld id="{093F68C3-195D-9E4F-A0F2-F73993E4FFAC}" type="datetime1">
               <a:rPr lang="fr-FR" smtClean="0"/>
-              <a:t>06/11/16</a:t>
+              <a:t>08/11/16</a:t>
             </a:fld>
             <a:endParaRPr lang="fr-FR" dirty="0"/>
           </a:p>
@@ -3810,7 +3810,7 @@
           <a:p>
             <a:fld id="{797E56E4-32A0-A24B-AE7B-5E5E4DFEC148}" type="datetime1">
               <a:rPr lang="fr-FR" smtClean="0"/>
-              <a:t>06/11/16</a:t>
+              <a:t>08/11/16</a:t>
             </a:fld>
             <a:endParaRPr lang="fr-FR" dirty="0"/>
           </a:p>
@@ -4721,7 +4721,7 @@
           <a:p>
             <a:fld id="{DE9A3856-CABC-754C-812C-14B8D30E1B18}" type="datetime1">
               <a:rPr lang="fr-FR" smtClean="0"/>
-              <a:t>06/11/16</a:t>
+              <a:t>08/11/16</a:t>
             </a:fld>
             <a:endParaRPr lang="fr-FR" dirty="0"/>
           </a:p>
@@ -5334,12 +5334,24 @@
             <p:ph idx="1"/>
           </p:nvPr>
         </p:nvSpPr>
-        <p:spPr/>
+        <p:spPr>
+          <a:xfrm>
+            <a:off x="279400" y="1236134"/>
+            <a:ext cx="8644466" cy="498920"/>
+          </a:xfrm>
+        </p:spPr>
         <p:txBody>
           <a:bodyPr/>
           <a:lstStyle/>
           <a:p>
-            <a:endParaRPr lang="fr-FR"/>
+            <a:r>
+              <a:rPr lang="en-US" dirty="0"/>
+              <a:t>Suppose you have a small alignment in PHYLIP format</a:t>
+            </a:r>
+            <a:endParaRPr lang="fr-FR" dirty="0"/>
+          </a:p>
+          <a:p>
+            <a:endParaRPr lang="fr-FR" dirty="0"/>
           </a:p>
         </p:txBody>
       </p:sp>
@@ -5360,7 +5372,7 @@
           <a:p>
             <a:fld id="{751463B9-2A29-154C-A5AC-383AEA094CA9}" type="datetime1">
               <a:rPr lang="fr-FR" smtClean="0"/>
-              <a:t>06/11/16</a:t>
+              <a:t>08/11/16</a:t>
             </a:fld>
             <a:endParaRPr lang="fr-FR" dirty="0"/>
           </a:p>
@@ -5409,6 +5421,386 @@
               <a:pPr/>
               <a:t>10</a:t>
             </a:fld>
+            <a:endParaRPr lang="fr-FR" dirty="0"/>
+          </a:p>
+        </p:txBody>
+      </p:sp>
+      <p:sp>
+        <p:nvSpPr>
+          <p:cNvPr id="7" name="ZoneTexte 6"/>
+          <p:cNvSpPr txBox="1"/>
+          <p:nvPr/>
+        </p:nvSpPr>
+        <p:spPr>
+          <a:xfrm>
+            <a:off x="279400" y="1961866"/>
+            <a:ext cx="8644466" cy="1107996"/>
+          </a:xfrm>
+          <a:prstGeom prst="rect">
+            <a:avLst/>
+          </a:prstGeom>
+          <a:solidFill>
+            <a:schemeClr val="accent2">
+              <a:lumMod val="60000"/>
+              <a:lumOff val="40000"/>
+            </a:schemeClr>
+          </a:solidFill>
+          <a:ln>
+            <a:noFill/>
+          </a:ln>
+        </p:spPr>
+        <p:txBody>
+          <a:bodyPr wrap="square" rtlCol="0">
+            <a:spAutoFit/>
+          </a:bodyPr>
+          <a:lstStyle>
+            <a:defPPr>
+              <a:defRPr lang="fr-FR"/>
+            </a:defPPr>
+            <a:lvl1pPr>
+              <a:defRPr sz="1400"/>
+            </a:lvl1pPr>
+          </a:lstStyle>
+          <a:p>
+            <a:r>
+              <a:rPr lang="nl-NL" sz="1100" dirty="0"/>
+              <a:t>5 6</a:t>
+            </a:r>
+          </a:p>
+          <a:p>
+            <a:r>
+              <a:rPr lang="nl-NL" sz="1100" dirty="0" err="1"/>
+              <a:t>Alpha</a:t>
+            </a:r>
+            <a:r>
+              <a:rPr lang="nl-NL" sz="1100" dirty="0"/>
+              <a:t> AACAAC</a:t>
+            </a:r>
+          </a:p>
+          <a:p>
+            <a:r>
+              <a:rPr lang="nl-NL" sz="1100" dirty="0" err="1"/>
+              <a:t>Beta</a:t>
+            </a:r>
+            <a:r>
+              <a:rPr lang="nl-NL" sz="1100" dirty="0"/>
+              <a:t> AACCCC</a:t>
+            </a:r>
+          </a:p>
+          <a:p>
+            <a:r>
+              <a:rPr lang="nl-NL" sz="1100" dirty="0"/>
+              <a:t>Gamma ACCAAC</a:t>
+            </a:r>
+          </a:p>
+          <a:p>
+            <a:r>
+              <a:rPr lang="nl-NL" sz="1100" dirty="0"/>
+              <a:t>Delta CCACCA</a:t>
+            </a:r>
+          </a:p>
+          <a:p>
+            <a:r>
+              <a:rPr lang="nl-NL" sz="1100" dirty="0"/>
+              <a:t>Epsilon CCAAAC</a:t>
+            </a:r>
+          </a:p>
+        </p:txBody>
+      </p:sp>
+      <p:sp>
+        <p:nvSpPr>
+          <p:cNvPr id="8" name="ZoneTexte 7"/>
+          <p:cNvSpPr txBox="1"/>
+          <p:nvPr/>
+        </p:nvSpPr>
+        <p:spPr>
+          <a:xfrm>
+            <a:off x="279400" y="3799000"/>
+            <a:ext cx="8644466" cy="1107996"/>
+          </a:xfrm>
+          <a:prstGeom prst="rect">
+            <a:avLst/>
+          </a:prstGeom>
+          <a:solidFill>
+            <a:schemeClr val="accent2">
+              <a:lumMod val="60000"/>
+              <a:lumOff val="40000"/>
+            </a:schemeClr>
+          </a:solidFill>
+          <a:ln>
+            <a:noFill/>
+          </a:ln>
+        </p:spPr>
+        <p:txBody>
+          <a:bodyPr wrap="square" rtlCol="0">
+            <a:spAutoFit/>
+          </a:bodyPr>
+          <a:lstStyle>
+            <a:defPPr>
+              <a:defRPr lang="fr-FR"/>
+            </a:defPPr>
+            <a:lvl1pPr>
+              <a:defRPr sz="1400"/>
+            </a:lvl1pPr>
+          </a:lstStyle>
+          <a:p>
+            <a:r>
+              <a:rPr lang="nl-NL" sz="1100" dirty="0"/>
+              <a:t>5 6</a:t>
+            </a:r>
+          </a:p>
+          <a:p>
+            <a:r>
+              <a:rPr lang="nl-NL" sz="1100" dirty="0" err="1"/>
+              <a:t>Alpha</a:t>
+            </a:r>
+            <a:r>
+              <a:rPr lang="nl-NL" sz="1100" dirty="0"/>
+              <a:t> AACAAC</a:t>
+            </a:r>
+          </a:p>
+          <a:p>
+            <a:r>
+              <a:rPr lang="nl-NL" sz="1100" dirty="0" err="1"/>
+              <a:t>Beta</a:t>
+            </a:r>
+            <a:r>
+              <a:rPr lang="nl-NL" sz="1100" dirty="0"/>
+              <a:t> AACCCC</a:t>
+            </a:r>
+          </a:p>
+          <a:p>
+            <a:r>
+              <a:rPr lang="nl-NL" sz="1100" dirty="0"/>
+              <a:t>Gamma ACCAAC</a:t>
+            </a:r>
+          </a:p>
+          <a:p>
+            <a:r>
+              <a:rPr lang="nl-NL" sz="1100" dirty="0"/>
+              <a:t>Delta CCACCA</a:t>
+            </a:r>
+          </a:p>
+          <a:p>
+            <a:r>
+              <a:rPr lang="nl-NL" sz="1100" dirty="0"/>
+              <a:t>Epsilon CCAAAC</a:t>
+            </a:r>
+          </a:p>
+        </p:txBody>
+      </p:sp>
+      <p:sp>
+        <p:nvSpPr>
+          <p:cNvPr id="9" name="Espace réservé du contenu 2"/>
+          <p:cNvSpPr txBox="1">
+            <a:spLocks/>
+          </p:cNvSpPr>
+          <p:nvPr/>
+        </p:nvSpPr>
+        <p:spPr>
+          <a:xfrm>
+            <a:off x="279400" y="3300080"/>
+            <a:ext cx="8644466" cy="498920"/>
+          </a:xfrm>
+          <a:prstGeom prst="rect">
+            <a:avLst/>
+          </a:prstGeom>
+        </p:spPr>
+        <p:txBody>
+          <a:bodyPr vert="horz" lIns="91440" tIns="45720" rIns="91440" bIns="45720" rtlCol="0">
+            <a:noAutofit/>
+          </a:bodyPr>
+          <a:lstStyle>
+            <a:lvl1pPr marL="342900" marR="0" indent="-342900" algn="l" defTabSz="457200" rtl="0" eaLnBrk="1" fontAlgn="auto" latinLnBrk="0" hangingPunct="1">
+              <a:lnSpc>
+                <a:spcPct val="100000"/>
+              </a:lnSpc>
+              <a:spcBef>
+                <a:spcPct val="20000"/>
+              </a:spcBef>
+              <a:spcAft>
+                <a:spcPts val="0"/>
+              </a:spcAft>
+              <a:buClr>
+                <a:schemeClr val="accent6"/>
+              </a:buClr>
+              <a:buSzTx/>
+              <a:buFont typeface="Lucida Grande"/>
+              <a:buChar char="➔"/>
+              <a:tabLst/>
+              <a:defRPr sz="2000" kern="1200">
+                <a:solidFill>
+                  <a:schemeClr val="tx1"/>
+                </a:solidFill>
+                <a:latin typeface="+mn-lt"/>
+                <a:ea typeface="+mn-ea"/>
+                <a:cs typeface="+mn-cs"/>
+              </a:defRPr>
+            </a:lvl1pPr>
+            <a:lvl2pPr marL="742950" marR="0" indent="-285750" algn="l" defTabSz="457200" rtl="0" eaLnBrk="1" fontAlgn="auto" latinLnBrk="0" hangingPunct="1">
+              <a:lnSpc>
+                <a:spcPct val="100000"/>
+              </a:lnSpc>
+              <a:spcBef>
+                <a:spcPct val="20000"/>
+              </a:spcBef>
+              <a:spcAft>
+                <a:spcPts val="0"/>
+              </a:spcAft>
+              <a:buClr>
+                <a:srgbClr val="009DE0"/>
+              </a:buClr>
+              <a:buSzTx/>
+              <a:buFont typeface="Arial"/>
+              <a:buChar char="›"/>
+              <a:tabLst/>
+              <a:defRPr sz="2800" kern="1200">
+                <a:solidFill>
+                  <a:schemeClr val="tx1"/>
+                </a:solidFill>
+                <a:latin typeface="+mn-lt"/>
+                <a:ea typeface="+mn-ea"/>
+                <a:cs typeface="+mn-cs"/>
+              </a:defRPr>
+            </a:lvl2pPr>
+            <a:lvl3pPr marL="1143000" marR="0" indent="-228600" algn="l" defTabSz="457200" rtl="0" eaLnBrk="1" fontAlgn="auto" latinLnBrk="0" hangingPunct="1">
+              <a:lnSpc>
+                <a:spcPct val="100000"/>
+              </a:lnSpc>
+              <a:spcBef>
+                <a:spcPct val="20000"/>
+              </a:spcBef>
+              <a:spcAft>
+                <a:spcPts val="0"/>
+              </a:spcAft>
+              <a:buClrTx/>
+              <a:buSzTx/>
+              <a:buFont typeface="Arial"/>
+              <a:buChar char="•"/>
+              <a:tabLst/>
+              <a:defRPr sz="2400" kern="1200">
+                <a:solidFill>
+                  <a:schemeClr val="tx1"/>
+                </a:solidFill>
+                <a:latin typeface="+mn-lt"/>
+                <a:ea typeface="+mn-ea"/>
+                <a:cs typeface="+mn-cs"/>
+              </a:defRPr>
+            </a:lvl3pPr>
+            <a:lvl4pPr marL="1600200" marR="0" indent="-228600" algn="l" defTabSz="457200" rtl="0" eaLnBrk="1" fontAlgn="auto" latinLnBrk="0" hangingPunct="1">
+              <a:lnSpc>
+                <a:spcPct val="100000"/>
+              </a:lnSpc>
+              <a:spcBef>
+                <a:spcPct val="20000"/>
+              </a:spcBef>
+              <a:spcAft>
+                <a:spcPts val="0"/>
+              </a:spcAft>
+              <a:buClrTx/>
+              <a:buSzTx/>
+              <a:buFont typeface="Arial"/>
+              <a:buChar char="–"/>
+              <a:tabLst/>
+              <a:defRPr sz="2000" kern="1200">
+                <a:solidFill>
+                  <a:schemeClr val="tx1"/>
+                </a:solidFill>
+                <a:latin typeface="+mn-lt"/>
+                <a:ea typeface="+mn-ea"/>
+                <a:cs typeface="+mn-cs"/>
+              </a:defRPr>
+            </a:lvl4pPr>
+            <a:lvl5pPr marL="2057400" marR="0" indent="-228600" algn="l" defTabSz="457200" rtl="0" eaLnBrk="1" fontAlgn="auto" latinLnBrk="0" hangingPunct="1">
+              <a:lnSpc>
+                <a:spcPct val="100000"/>
+              </a:lnSpc>
+              <a:spcBef>
+                <a:spcPct val="20000"/>
+              </a:spcBef>
+              <a:spcAft>
+                <a:spcPts val="0"/>
+              </a:spcAft>
+              <a:buClrTx/>
+              <a:buSzTx/>
+              <a:buFont typeface="Arial"/>
+              <a:buChar char="»"/>
+              <a:tabLst/>
+              <a:defRPr sz="2000" kern="1200">
+                <a:solidFill>
+                  <a:schemeClr val="tx1"/>
+                </a:solidFill>
+                <a:latin typeface="+mn-lt"/>
+                <a:ea typeface="+mn-ea"/>
+                <a:cs typeface="+mn-cs"/>
+              </a:defRPr>
+            </a:lvl5pPr>
+            <a:lvl6pPr marL="2514600" indent="-228600" algn="l" defTabSz="457200" rtl="0" eaLnBrk="1" latinLnBrk="0" hangingPunct="1">
+              <a:spcBef>
+                <a:spcPct val="20000"/>
+              </a:spcBef>
+              <a:buFont typeface="Arial"/>
+              <a:buChar char="•"/>
+              <a:defRPr sz="2000" kern="1200">
+                <a:solidFill>
+                  <a:schemeClr val="tx1"/>
+                </a:solidFill>
+                <a:latin typeface="+mn-lt"/>
+                <a:ea typeface="+mn-ea"/>
+                <a:cs typeface="+mn-cs"/>
+              </a:defRPr>
+            </a:lvl6pPr>
+            <a:lvl7pPr marL="2971800" indent="-228600" algn="l" defTabSz="457200" rtl="0" eaLnBrk="1" latinLnBrk="0" hangingPunct="1">
+              <a:spcBef>
+                <a:spcPct val="20000"/>
+              </a:spcBef>
+              <a:buFont typeface="Arial"/>
+              <a:buChar char="•"/>
+              <a:defRPr sz="2000" kern="1200">
+                <a:solidFill>
+                  <a:schemeClr val="tx1"/>
+                </a:solidFill>
+                <a:latin typeface="+mn-lt"/>
+                <a:ea typeface="+mn-ea"/>
+                <a:cs typeface="+mn-cs"/>
+              </a:defRPr>
+            </a:lvl7pPr>
+            <a:lvl8pPr marL="3429000" indent="-228600" algn="l" defTabSz="457200" rtl="0" eaLnBrk="1" latinLnBrk="0" hangingPunct="1">
+              <a:spcBef>
+                <a:spcPct val="20000"/>
+              </a:spcBef>
+              <a:buFont typeface="Arial"/>
+              <a:buChar char="•"/>
+              <a:defRPr sz="2000" kern="1200">
+                <a:solidFill>
+                  <a:schemeClr val="tx1"/>
+                </a:solidFill>
+                <a:latin typeface="+mn-lt"/>
+                <a:ea typeface="+mn-ea"/>
+                <a:cs typeface="+mn-cs"/>
+              </a:defRPr>
+            </a:lvl8pPr>
+            <a:lvl9pPr marL="3886200" indent="-228600" algn="l" defTabSz="457200" rtl="0" eaLnBrk="1" latinLnBrk="0" hangingPunct="1">
+              <a:spcBef>
+                <a:spcPct val="20000"/>
+              </a:spcBef>
+              <a:buFont typeface="Arial"/>
+              <a:buChar char="•"/>
+              <a:defRPr sz="2000" kern="1200">
+                <a:solidFill>
+                  <a:schemeClr val="tx1"/>
+                </a:solidFill>
+                <a:latin typeface="+mn-lt"/>
+                <a:ea typeface="+mn-ea"/>
+                <a:cs typeface="+mn-cs"/>
+              </a:defRPr>
+            </a:lvl9pPr>
+          </a:lstStyle>
+          <a:p>
+            <a:r>
+              <a:rPr lang="en-US" dirty="0" smtClean="0"/>
+              <a:t>Suppose you have a small alignment in PHYLIP format</a:t>
+            </a:r>
             <a:endParaRPr lang="fr-FR" dirty="0"/>
           </a:p>
         </p:txBody>
@@ -5484,10 +5876,22 @@
             <p:ph idx="1"/>
           </p:nvPr>
         </p:nvSpPr>
-        <p:spPr/>
+        <p:spPr>
+          <a:xfrm>
+            <a:off x="279400" y="1236134"/>
+            <a:ext cx="8644466" cy="487580"/>
+          </a:xfrm>
+        </p:spPr>
         <p:txBody>
           <a:bodyPr/>
           <a:lstStyle/>
+          <a:p>
+            <a:r>
+              <a:rPr lang="en-US" dirty="0"/>
+              <a:t>Suppose you have a small alignment in PHYLIP format</a:t>
+            </a:r>
+            <a:endParaRPr lang="fr-FR" dirty="0"/>
+          </a:p>
           <a:p>
             <a:endParaRPr lang="fr-FR" dirty="0"/>
           </a:p>
@@ -5510,7 +5914,7 @@
           <a:p>
             <a:fld id="{751463B9-2A29-154C-A5AC-383AEA094CA9}" type="datetime1">
               <a:rPr lang="fr-FR" smtClean="0"/>
-              <a:t>06/11/16</a:t>
+              <a:t>08/11/16</a:t>
             </a:fld>
             <a:endParaRPr lang="fr-FR" dirty="0"/>
           </a:p>
@@ -5559,6 +5963,389 @@
               <a:pPr/>
               <a:t>11</a:t>
             </a:fld>
+            <a:endParaRPr lang="fr-FR" dirty="0"/>
+          </a:p>
+        </p:txBody>
+      </p:sp>
+      <p:sp>
+        <p:nvSpPr>
+          <p:cNvPr id="7" name="ZoneTexte 6"/>
+          <p:cNvSpPr txBox="1"/>
+          <p:nvPr/>
+        </p:nvSpPr>
+        <p:spPr>
+          <a:xfrm>
+            <a:off x="279400" y="1927845"/>
+            <a:ext cx="8644466" cy="1107996"/>
+          </a:xfrm>
+          <a:prstGeom prst="rect">
+            <a:avLst/>
+          </a:prstGeom>
+          <a:solidFill>
+            <a:schemeClr val="accent2">
+              <a:lumMod val="60000"/>
+              <a:lumOff val="40000"/>
+            </a:schemeClr>
+          </a:solidFill>
+          <a:ln>
+            <a:noFill/>
+          </a:ln>
+        </p:spPr>
+        <p:txBody>
+          <a:bodyPr wrap="square" rtlCol="0">
+            <a:spAutoFit/>
+          </a:bodyPr>
+          <a:lstStyle>
+            <a:defPPr>
+              <a:defRPr lang="fr-FR"/>
+            </a:defPPr>
+            <a:lvl1pPr>
+              <a:defRPr sz="1400"/>
+            </a:lvl1pPr>
+          </a:lstStyle>
+          <a:p>
+            <a:r>
+              <a:rPr lang="nl-NL" sz="1100" dirty="0"/>
+              <a:t>5 6</a:t>
+            </a:r>
+          </a:p>
+          <a:p>
+            <a:r>
+              <a:rPr lang="nl-NL" sz="1100" dirty="0" err="1"/>
+              <a:t>Alpha</a:t>
+            </a:r>
+            <a:r>
+              <a:rPr lang="nl-NL" sz="1100" dirty="0"/>
+              <a:t> AACAAC</a:t>
+            </a:r>
+          </a:p>
+          <a:p>
+            <a:r>
+              <a:rPr lang="nl-NL" sz="1100" dirty="0" err="1"/>
+              <a:t>Beta</a:t>
+            </a:r>
+            <a:r>
+              <a:rPr lang="nl-NL" sz="1100" dirty="0"/>
+              <a:t> AACCCC</a:t>
+            </a:r>
+          </a:p>
+          <a:p>
+            <a:r>
+              <a:rPr lang="nl-NL" sz="1100" dirty="0"/>
+              <a:t>Gamma ACCAAC</a:t>
+            </a:r>
+          </a:p>
+          <a:p>
+            <a:r>
+              <a:rPr lang="nl-NL" sz="1100" dirty="0"/>
+              <a:t>Delta CCACCA</a:t>
+            </a:r>
+          </a:p>
+          <a:p>
+            <a:r>
+              <a:rPr lang="nl-NL" sz="1100" dirty="0"/>
+              <a:t>Epsilon CCAAAC</a:t>
+            </a:r>
+          </a:p>
+        </p:txBody>
+      </p:sp>
+      <p:sp>
+        <p:nvSpPr>
+          <p:cNvPr id="8" name="ZoneTexte 7"/>
+          <p:cNvSpPr txBox="1"/>
+          <p:nvPr/>
+        </p:nvSpPr>
+        <p:spPr>
+          <a:xfrm>
+            <a:off x="279400" y="4354653"/>
+            <a:ext cx="8644466" cy="1107996"/>
+          </a:xfrm>
+          <a:prstGeom prst="rect">
+            <a:avLst/>
+          </a:prstGeom>
+          <a:solidFill>
+            <a:schemeClr val="accent2">
+              <a:lumMod val="60000"/>
+              <a:lumOff val="40000"/>
+            </a:schemeClr>
+          </a:solidFill>
+          <a:ln>
+            <a:noFill/>
+          </a:ln>
+        </p:spPr>
+        <p:txBody>
+          <a:bodyPr wrap="square" rtlCol="0">
+            <a:spAutoFit/>
+          </a:bodyPr>
+          <a:lstStyle>
+            <a:defPPr>
+              <a:defRPr lang="fr-FR"/>
+            </a:defPPr>
+            <a:lvl1pPr>
+              <a:defRPr sz="1400"/>
+            </a:lvl1pPr>
+          </a:lstStyle>
+          <a:p>
+            <a:r>
+              <a:rPr lang="nl-NL" sz="1100" dirty="0"/>
+              <a:t>5 6</a:t>
+            </a:r>
+          </a:p>
+          <a:p>
+            <a:r>
+              <a:rPr lang="nl-NL" sz="1100" dirty="0" err="1"/>
+              <a:t>Alpha</a:t>
+            </a:r>
+            <a:r>
+              <a:rPr lang="nl-NL" sz="1100" dirty="0"/>
+              <a:t> AACAAC</a:t>
+            </a:r>
+          </a:p>
+          <a:p>
+            <a:r>
+              <a:rPr lang="nl-NL" sz="1100" dirty="0" err="1"/>
+              <a:t>Beta</a:t>
+            </a:r>
+            <a:r>
+              <a:rPr lang="nl-NL" sz="1100" dirty="0"/>
+              <a:t> AACCCC</a:t>
+            </a:r>
+          </a:p>
+          <a:p>
+            <a:r>
+              <a:rPr lang="nl-NL" sz="1100" dirty="0"/>
+              <a:t>Gamma ACCAAC</a:t>
+            </a:r>
+          </a:p>
+          <a:p>
+            <a:r>
+              <a:rPr lang="nl-NL" sz="1100" dirty="0"/>
+              <a:t>Delta CCACCA</a:t>
+            </a:r>
+          </a:p>
+          <a:p>
+            <a:r>
+              <a:rPr lang="nl-NL" sz="1100" dirty="0"/>
+              <a:t>Epsilon CCAAAC</a:t>
+            </a:r>
+          </a:p>
+        </p:txBody>
+      </p:sp>
+      <p:sp>
+        <p:nvSpPr>
+          <p:cNvPr id="10" name="Espace réservé du contenu 2"/>
+          <p:cNvSpPr txBox="1">
+            <a:spLocks/>
+          </p:cNvSpPr>
+          <p:nvPr/>
+        </p:nvSpPr>
+        <p:spPr>
+          <a:xfrm>
+            <a:off x="279400" y="3577197"/>
+            <a:ext cx="8644466" cy="487580"/>
+          </a:xfrm>
+          <a:prstGeom prst="rect">
+            <a:avLst/>
+          </a:prstGeom>
+        </p:spPr>
+        <p:txBody>
+          <a:bodyPr vert="horz" lIns="91440" tIns="45720" rIns="91440" bIns="45720" rtlCol="0">
+            <a:noAutofit/>
+          </a:bodyPr>
+          <a:lstStyle>
+            <a:lvl1pPr marL="342900" marR="0" indent="-342900" algn="l" defTabSz="457200" rtl="0" eaLnBrk="1" fontAlgn="auto" latinLnBrk="0" hangingPunct="1">
+              <a:lnSpc>
+                <a:spcPct val="100000"/>
+              </a:lnSpc>
+              <a:spcBef>
+                <a:spcPct val="20000"/>
+              </a:spcBef>
+              <a:spcAft>
+                <a:spcPts val="0"/>
+              </a:spcAft>
+              <a:buClr>
+                <a:schemeClr val="accent6"/>
+              </a:buClr>
+              <a:buSzTx/>
+              <a:buFont typeface="Lucida Grande"/>
+              <a:buChar char="➔"/>
+              <a:tabLst/>
+              <a:defRPr sz="2000" kern="1200">
+                <a:solidFill>
+                  <a:schemeClr val="tx1"/>
+                </a:solidFill>
+                <a:latin typeface="+mn-lt"/>
+                <a:ea typeface="+mn-ea"/>
+                <a:cs typeface="+mn-cs"/>
+              </a:defRPr>
+            </a:lvl1pPr>
+            <a:lvl2pPr marL="742950" marR="0" indent="-285750" algn="l" defTabSz="457200" rtl="0" eaLnBrk="1" fontAlgn="auto" latinLnBrk="0" hangingPunct="1">
+              <a:lnSpc>
+                <a:spcPct val="100000"/>
+              </a:lnSpc>
+              <a:spcBef>
+                <a:spcPct val="20000"/>
+              </a:spcBef>
+              <a:spcAft>
+                <a:spcPts val="0"/>
+              </a:spcAft>
+              <a:buClr>
+                <a:srgbClr val="009DE0"/>
+              </a:buClr>
+              <a:buSzTx/>
+              <a:buFont typeface="Arial"/>
+              <a:buChar char="›"/>
+              <a:tabLst/>
+              <a:defRPr sz="2800" kern="1200">
+                <a:solidFill>
+                  <a:schemeClr val="tx1"/>
+                </a:solidFill>
+                <a:latin typeface="+mn-lt"/>
+                <a:ea typeface="+mn-ea"/>
+                <a:cs typeface="+mn-cs"/>
+              </a:defRPr>
+            </a:lvl2pPr>
+            <a:lvl3pPr marL="1143000" marR="0" indent="-228600" algn="l" defTabSz="457200" rtl="0" eaLnBrk="1" fontAlgn="auto" latinLnBrk="0" hangingPunct="1">
+              <a:lnSpc>
+                <a:spcPct val="100000"/>
+              </a:lnSpc>
+              <a:spcBef>
+                <a:spcPct val="20000"/>
+              </a:spcBef>
+              <a:spcAft>
+                <a:spcPts val="0"/>
+              </a:spcAft>
+              <a:buClrTx/>
+              <a:buSzTx/>
+              <a:buFont typeface="Arial"/>
+              <a:buChar char="•"/>
+              <a:tabLst/>
+              <a:defRPr sz="2400" kern="1200">
+                <a:solidFill>
+                  <a:schemeClr val="tx1"/>
+                </a:solidFill>
+                <a:latin typeface="+mn-lt"/>
+                <a:ea typeface="+mn-ea"/>
+                <a:cs typeface="+mn-cs"/>
+              </a:defRPr>
+            </a:lvl3pPr>
+            <a:lvl4pPr marL="1600200" marR="0" indent="-228600" algn="l" defTabSz="457200" rtl="0" eaLnBrk="1" fontAlgn="auto" latinLnBrk="0" hangingPunct="1">
+              <a:lnSpc>
+                <a:spcPct val="100000"/>
+              </a:lnSpc>
+              <a:spcBef>
+                <a:spcPct val="20000"/>
+              </a:spcBef>
+              <a:spcAft>
+                <a:spcPts val="0"/>
+              </a:spcAft>
+              <a:buClrTx/>
+              <a:buSzTx/>
+              <a:buFont typeface="Arial"/>
+              <a:buChar char="–"/>
+              <a:tabLst/>
+              <a:defRPr sz="2000" kern="1200">
+                <a:solidFill>
+                  <a:schemeClr val="tx1"/>
+                </a:solidFill>
+                <a:latin typeface="+mn-lt"/>
+                <a:ea typeface="+mn-ea"/>
+                <a:cs typeface="+mn-cs"/>
+              </a:defRPr>
+            </a:lvl4pPr>
+            <a:lvl5pPr marL="2057400" marR="0" indent="-228600" algn="l" defTabSz="457200" rtl="0" eaLnBrk="1" fontAlgn="auto" latinLnBrk="0" hangingPunct="1">
+              <a:lnSpc>
+                <a:spcPct val="100000"/>
+              </a:lnSpc>
+              <a:spcBef>
+                <a:spcPct val="20000"/>
+              </a:spcBef>
+              <a:spcAft>
+                <a:spcPts val="0"/>
+              </a:spcAft>
+              <a:buClrTx/>
+              <a:buSzTx/>
+              <a:buFont typeface="Arial"/>
+              <a:buChar char="»"/>
+              <a:tabLst/>
+              <a:defRPr sz="2000" kern="1200">
+                <a:solidFill>
+                  <a:schemeClr val="tx1"/>
+                </a:solidFill>
+                <a:latin typeface="+mn-lt"/>
+                <a:ea typeface="+mn-ea"/>
+                <a:cs typeface="+mn-cs"/>
+              </a:defRPr>
+            </a:lvl5pPr>
+            <a:lvl6pPr marL="2514600" indent="-228600" algn="l" defTabSz="457200" rtl="0" eaLnBrk="1" latinLnBrk="0" hangingPunct="1">
+              <a:spcBef>
+                <a:spcPct val="20000"/>
+              </a:spcBef>
+              <a:buFont typeface="Arial"/>
+              <a:buChar char="•"/>
+              <a:defRPr sz="2000" kern="1200">
+                <a:solidFill>
+                  <a:schemeClr val="tx1"/>
+                </a:solidFill>
+                <a:latin typeface="+mn-lt"/>
+                <a:ea typeface="+mn-ea"/>
+                <a:cs typeface="+mn-cs"/>
+              </a:defRPr>
+            </a:lvl6pPr>
+            <a:lvl7pPr marL="2971800" indent="-228600" algn="l" defTabSz="457200" rtl="0" eaLnBrk="1" latinLnBrk="0" hangingPunct="1">
+              <a:spcBef>
+                <a:spcPct val="20000"/>
+              </a:spcBef>
+              <a:buFont typeface="Arial"/>
+              <a:buChar char="•"/>
+              <a:defRPr sz="2000" kern="1200">
+                <a:solidFill>
+                  <a:schemeClr val="tx1"/>
+                </a:solidFill>
+                <a:latin typeface="+mn-lt"/>
+                <a:ea typeface="+mn-ea"/>
+                <a:cs typeface="+mn-cs"/>
+              </a:defRPr>
+            </a:lvl7pPr>
+            <a:lvl8pPr marL="3429000" indent="-228600" algn="l" defTabSz="457200" rtl="0" eaLnBrk="1" latinLnBrk="0" hangingPunct="1">
+              <a:spcBef>
+                <a:spcPct val="20000"/>
+              </a:spcBef>
+              <a:buFont typeface="Arial"/>
+              <a:buChar char="•"/>
+              <a:defRPr sz="2000" kern="1200">
+                <a:solidFill>
+                  <a:schemeClr val="tx1"/>
+                </a:solidFill>
+                <a:latin typeface="+mn-lt"/>
+                <a:ea typeface="+mn-ea"/>
+                <a:cs typeface="+mn-cs"/>
+              </a:defRPr>
+            </a:lvl8pPr>
+            <a:lvl9pPr marL="3886200" indent="-228600" algn="l" defTabSz="457200" rtl="0" eaLnBrk="1" latinLnBrk="0" hangingPunct="1">
+              <a:spcBef>
+                <a:spcPct val="20000"/>
+              </a:spcBef>
+              <a:buFont typeface="Arial"/>
+              <a:buChar char="•"/>
+              <a:defRPr sz="2000" kern="1200">
+                <a:solidFill>
+                  <a:schemeClr val="tx1"/>
+                </a:solidFill>
+                <a:latin typeface="+mn-lt"/>
+                <a:ea typeface="+mn-ea"/>
+                <a:cs typeface="+mn-cs"/>
+              </a:defRPr>
+            </a:lvl9pPr>
+          </a:lstStyle>
+          <a:p>
+            <a:r>
+              <a:rPr lang="en-US" smtClean="0"/>
+              <a:t>Suppose you have a small alignment in PHYLIP format</a:t>
+            </a:r>
+            <a:endParaRPr lang="fr-FR" smtClean="0"/>
+          </a:p>
+          <a:p>
             <a:endParaRPr lang="fr-FR" dirty="0"/>
           </a:p>
         </p:txBody>
@@ -5622,7 +6409,12 @@
             <p:ph idx="1"/>
           </p:nvPr>
         </p:nvSpPr>
-        <p:spPr/>
+        <p:spPr>
+          <a:xfrm>
+            <a:off x="279400" y="1236134"/>
+            <a:ext cx="8644466" cy="600982"/>
+          </a:xfrm>
+        </p:spPr>
         <p:txBody>
           <a:bodyPr/>
           <a:lstStyle/>
@@ -5648,7 +6440,7 @@
           <a:p>
             <a:fld id="{751463B9-2A29-154C-A5AC-383AEA094CA9}" type="datetime1">
               <a:rPr lang="fr-FR" smtClean="0"/>
-              <a:t>06/11/16</a:t>
+              <a:t>08/11/16</a:t>
             </a:fld>
             <a:endParaRPr lang="fr-FR" dirty="0"/>
           </a:p>
@@ -5760,12 +6552,17 @@
             <p:ph idx="1"/>
           </p:nvPr>
         </p:nvSpPr>
-        <p:spPr/>
+        <p:spPr>
+          <a:xfrm>
+            <a:off x="279400" y="1236134"/>
+            <a:ext cx="8644466" cy="646343"/>
+          </a:xfrm>
+        </p:spPr>
         <p:txBody>
           <a:bodyPr/>
           <a:lstStyle/>
           <a:p>
-            <a:endParaRPr lang="fr-FR"/>
+            <a:endParaRPr lang="fr-FR" dirty="0"/>
           </a:p>
         </p:txBody>
       </p:sp>
@@ -5786,7 +6583,7 @@
           <a:p>
             <a:fld id="{751463B9-2A29-154C-A5AC-383AEA094CA9}" type="datetime1">
               <a:rPr lang="fr-FR" smtClean="0"/>
-              <a:t>06/11/16</a:t>
+              <a:t>08/11/16</a:t>
             </a:fld>
             <a:endParaRPr lang="fr-FR" dirty="0"/>
           </a:p>
@@ -5836,6 +6633,170 @@
               <a:t>13</a:t>
             </a:fld>
             <a:endParaRPr lang="fr-FR" dirty="0"/>
+          </a:p>
+        </p:txBody>
+      </p:sp>
+      <p:sp>
+        <p:nvSpPr>
+          <p:cNvPr id="7" name="ZoneTexte 6"/>
+          <p:cNvSpPr txBox="1"/>
+          <p:nvPr/>
+        </p:nvSpPr>
+        <p:spPr>
+          <a:xfrm>
+            <a:off x="279400" y="2086607"/>
+            <a:ext cx="8644466" cy="1107996"/>
+          </a:xfrm>
+          <a:prstGeom prst="rect">
+            <a:avLst/>
+          </a:prstGeom>
+          <a:solidFill>
+            <a:schemeClr val="accent2">
+              <a:lumMod val="60000"/>
+              <a:lumOff val="40000"/>
+            </a:schemeClr>
+          </a:solidFill>
+          <a:ln>
+            <a:noFill/>
+          </a:ln>
+        </p:spPr>
+        <p:txBody>
+          <a:bodyPr wrap="square" rtlCol="0">
+            <a:spAutoFit/>
+          </a:bodyPr>
+          <a:lstStyle>
+            <a:defPPr>
+              <a:defRPr lang="fr-FR"/>
+            </a:defPPr>
+            <a:lvl1pPr>
+              <a:defRPr sz="1400"/>
+            </a:lvl1pPr>
+          </a:lstStyle>
+          <a:p>
+            <a:r>
+              <a:rPr lang="nl-NL" sz="1100" dirty="0"/>
+              <a:t>5 6</a:t>
+            </a:r>
+          </a:p>
+          <a:p>
+            <a:r>
+              <a:rPr lang="nl-NL" sz="1100" dirty="0" err="1"/>
+              <a:t>Alpha</a:t>
+            </a:r>
+            <a:r>
+              <a:rPr lang="nl-NL" sz="1100" dirty="0"/>
+              <a:t> AACAAC</a:t>
+            </a:r>
+          </a:p>
+          <a:p>
+            <a:r>
+              <a:rPr lang="nl-NL" sz="1100" dirty="0" err="1"/>
+              <a:t>Beta</a:t>
+            </a:r>
+            <a:r>
+              <a:rPr lang="nl-NL" sz="1100" dirty="0"/>
+              <a:t> AACCCC</a:t>
+            </a:r>
+          </a:p>
+          <a:p>
+            <a:r>
+              <a:rPr lang="nl-NL" sz="1100" dirty="0"/>
+              <a:t>Gamma ACCAAC</a:t>
+            </a:r>
+          </a:p>
+          <a:p>
+            <a:r>
+              <a:rPr lang="nl-NL" sz="1100" dirty="0"/>
+              <a:t>Delta CCACCA</a:t>
+            </a:r>
+          </a:p>
+          <a:p>
+            <a:r>
+              <a:rPr lang="nl-NL" sz="1100" dirty="0"/>
+              <a:t>Epsilon CCAAAC</a:t>
+            </a:r>
+          </a:p>
+        </p:txBody>
+      </p:sp>
+      <p:sp>
+        <p:nvSpPr>
+          <p:cNvPr id="8" name="ZoneTexte 7"/>
+          <p:cNvSpPr txBox="1"/>
+          <p:nvPr/>
+        </p:nvSpPr>
+        <p:spPr>
+          <a:xfrm>
+            <a:off x="279400" y="4921664"/>
+            <a:ext cx="8644466" cy="1107996"/>
+          </a:xfrm>
+          <a:prstGeom prst="rect">
+            <a:avLst/>
+          </a:prstGeom>
+          <a:solidFill>
+            <a:schemeClr val="accent2">
+              <a:lumMod val="60000"/>
+              <a:lumOff val="40000"/>
+            </a:schemeClr>
+          </a:solidFill>
+          <a:ln>
+            <a:noFill/>
+          </a:ln>
+        </p:spPr>
+        <p:txBody>
+          <a:bodyPr wrap="square" rtlCol="0">
+            <a:spAutoFit/>
+          </a:bodyPr>
+          <a:lstStyle>
+            <a:defPPr>
+              <a:defRPr lang="fr-FR"/>
+            </a:defPPr>
+            <a:lvl1pPr>
+              <a:defRPr sz="1400"/>
+            </a:lvl1pPr>
+          </a:lstStyle>
+          <a:p>
+            <a:r>
+              <a:rPr lang="nl-NL" sz="1100" dirty="0"/>
+              <a:t>5 6</a:t>
+            </a:r>
+          </a:p>
+          <a:p>
+            <a:r>
+              <a:rPr lang="nl-NL" sz="1100" dirty="0" err="1"/>
+              <a:t>Alpha</a:t>
+            </a:r>
+            <a:r>
+              <a:rPr lang="nl-NL" sz="1100" dirty="0"/>
+              <a:t> AACAAC</a:t>
+            </a:r>
+          </a:p>
+          <a:p>
+            <a:r>
+              <a:rPr lang="nl-NL" sz="1100" dirty="0" err="1"/>
+              <a:t>Beta</a:t>
+            </a:r>
+            <a:r>
+              <a:rPr lang="nl-NL" sz="1100" dirty="0"/>
+              <a:t> AACCCC</a:t>
+            </a:r>
+          </a:p>
+          <a:p>
+            <a:r>
+              <a:rPr lang="nl-NL" sz="1100" dirty="0"/>
+              <a:t>Gamma ACCAAC</a:t>
+            </a:r>
+          </a:p>
+          <a:p>
+            <a:r>
+              <a:rPr lang="nl-NL" sz="1100" dirty="0"/>
+              <a:t>Delta CCACCA</a:t>
+            </a:r>
+          </a:p>
+          <a:p>
+            <a:r>
+              <a:rPr lang="nl-NL" sz="1100" dirty="0"/>
+              <a:t>Epsilon CCAAAC</a:t>
+            </a:r>
           </a:p>
         </p:txBody>
       </p:sp>
@@ -5924,7 +6885,7 @@
           <a:p>
             <a:fld id="{751463B9-2A29-154C-A5AC-383AEA094CA9}" type="datetime1">
               <a:rPr lang="fr-FR" smtClean="0"/>
-              <a:t>06/11/16</a:t>
+              <a:t>08/11/16</a:t>
             </a:fld>
             <a:endParaRPr lang="fr-FR" dirty="0"/>
           </a:p>
@@ -6062,7 +7023,7 @@
           <a:p>
             <a:fld id="{751463B9-2A29-154C-A5AC-383AEA094CA9}" type="datetime1">
               <a:rPr lang="fr-FR" smtClean="0"/>
-              <a:t>06/11/16</a:t>
+              <a:t>08/11/16</a:t>
             </a:fld>
             <a:endParaRPr lang="fr-FR" dirty="0"/>
           </a:p>
@@ -6200,7 +7161,7 @@
           <a:p>
             <a:fld id="{751463B9-2A29-154C-A5AC-383AEA094CA9}" type="datetime1">
               <a:rPr lang="fr-FR" smtClean="0"/>
-              <a:t>06/11/16</a:t>
+              <a:t>08/11/16</a:t>
             </a:fld>
             <a:endParaRPr lang="fr-FR" dirty="0"/>
           </a:p>
@@ -6338,7 +7299,7 @@
           <a:p>
             <a:fld id="{751463B9-2A29-154C-A5AC-383AEA094CA9}" type="datetime1">
               <a:rPr lang="fr-FR" smtClean="0"/>
-              <a:t>06/11/16</a:t>
+              <a:t>08/11/16</a:t>
             </a:fld>
             <a:endParaRPr lang="fr-FR" dirty="0"/>
           </a:p>
@@ -6476,7 +7437,7 @@
           <a:p>
             <a:fld id="{751463B9-2A29-154C-A5AC-383AEA094CA9}" type="datetime1">
               <a:rPr lang="fr-FR" smtClean="0"/>
-              <a:t>06/11/16</a:t>
+              <a:t>08/11/16</a:t>
             </a:fld>
             <a:endParaRPr lang="fr-FR" dirty="0"/>
           </a:p>
@@ -6614,7 +7575,7 @@
           <a:p>
             <a:fld id="{751463B9-2A29-154C-A5AC-383AEA094CA9}" type="datetime1">
               <a:rPr lang="fr-FR" smtClean="0"/>
-              <a:t>06/11/16</a:t>
+              <a:t>08/11/16</a:t>
             </a:fld>
             <a:endParaRPr lang="fr-FR" dirty="0"/>
           </a:p>
@@ -6977,7 +7938,7 @@
           <a:p>
             <a:fld id="{751463B9-2A29-154C-A5AC-383AEA094CA9}" type="datetime1">
               <a:rPr lang="fr-FR" smtClean="0"/>
-              <a:t>06/11/16</a:t>
+              <a:t>08/11/16</a:t>
             </a:fld>
             <a:endParaRPr lang="fr-FR" dirty="0"/>
           </a:p>
@@ -7115,7 +8076,7 @@
           <a:p>
             <a:fld id="{751463B9-2A29-154C-A5AC-383AEA094CA9}" type="datetime1">
               <a:rPr lang="fr-FR" smtClean="0"/>
-              <a:t>06/11/16</a:t>
+              <a:t>08/11/16</a:t>
             </a:fld>
             <a:endParaRPr lang="fr-FR" dirty="0"/>
           </a:p>
@@ -7253,7 +8214,7 @@
           <a:p>
             <a:fld id="{751463B9-2A29-154C-A5AC-383AEA094CA9}" type="datetime1">
               <a:rPr lang="fr-FR" smtClean="0"/>
-              <a:t>06/11/16</a:t>
+              <a:t>08/11/16</a:t>
             </a:fld>
             <a:endParaRPr lang="fr-FR" dirty="0"/>
           </a:p>
@@ -7391,7 +8352,7 @@
           <a:p>
             <a:fld id="{751463B9-2A29-154C-A5AC-383AEA094CA9}" type="datetime1">
               <a:rPr lang="fr-FR" smtClean="0"/>
-              <a:t>06/11/16</a:t>
+              <a:t>08/11/16</a:t>
             </a:fld>
             <a:endParaRPr lang="fr-FR" dirty="0"/>
           </a:p>
@@ -7529,7 +8490,7 @@
           <a:p>
             <a:fld id="{751463B9-2A29-154C-A5AC-383AEA094CA9}" type="datetime1">
               <a:rPr lang="fr-FR" smtClean="0"/>
-              <a:t>06/11/16</a:t>
+              <a:t>08/11/16</a:t>
             </a:fld>
             <a:endParaRPr lang="fr-FR" dirty="0"/>
           </a:p>
@@ -7667,7 +8628,7 @@
           <a:p>
             <a:fld id="{751463B9-2A29-154C-A5AC-383AEA094CA9}" type="datetime1">
               <a:rPr lang="fr-FR" smtClean="0"/>
-              <a:t>06/11/16</a:t>
+              <a:t>08/11/16</a:t>
             </a:fld>
             <a:endParaRPr lang="fr-FR" dirty="0"/>
           </a:p>
@@ -7973,7 +8934,7 @@
           <a:p>
             <a:fld id="{19B5B906-DB60-254B-B982-F62329EB7F88}" type="datetime1">
               <a:rPr lang="fr-FR" smtClean="0"/>
-              <a:t>06/11/16</a:t>
+              <a:t>08/11/16</a:t>
             </a:fld>
             <a:endParaRPr lang="fr-FR" dirty="0"/>
           </a:p>
@@ -8438,7 +9399,7 @@
           <a:p>
             <a:fld id="{751463B9-2A29-154C-A5AC-383AEA094CA9}" type="datetime1">
               <a:rPr lang="fr-FR" smtClean="0"/>
-              <a:t>06/11/16</a:t>
+              <a:t>08/11/16</a:t>
             </a:fld>
             <a:endParaRPr lang="fr-FR" dirty="0"/>
           </a:p>
@@ -8536,7 +9497,11 @@
           <a:bodyPr/>
           <a:lstStyle/>
           <a:p>
-            <a:endParaRPr lang="fr-FR"/>
+            <a:r>
+              <a:rPr lang="en-US" dirty="0"/>
+              <a:t>Single Alignments</a:t>
+            </a:r>
+            <a:endParaRPr lang="fr-FR" dirty="0"/>
           </a:p>
         </p:txBody>
       </p:sp>
@@ -8560,7 +9525,24 @@
           <a:bodyPr/>
           <a:lstStyle/>
           <a:p>
-            <a:endParaRPr lang="fr-FR"/>
+            <a:r>
+              <a:rPr lang="en-US" dirty="0"/>
+              <a:t>consider the following annotation rich protein alignment in the PFAM or Stockholm </a:t>
+            </a:r>
+            <a:r>
+              <a:rPr lang="en-US" dirty="0" smtClean="0"/>
+              <a:t>file</a:t>
+            </a:r>
+            <a:endParaRPr lang="en-US" dirty="0"/>
+          </a:p>
+          <a:p>
+            <a:r>
+              <a:rPr lang="en-US" dirty="0"/>
+              <a:t>format</a:t>
+            </a:r>
+          </a:p>
+          <a:p>
+            <a:endParaRPr lang="fr-FR" dirty="0"/>
           </a:p>
         </p:txBody>
       </p:sp>
@@ -8581,7 +9563,7 @@
           <a:p>
             <a:fld id="{751463B9-2A29-154C-A5AC-383AEA094CA9}" type="datetime1">
               <a:rPr lang="fr-FR" smtClean="0"/>
-              <a:t>06/11/16</a:t>
+              <a:t>08/11/16</a:t>
             </a:fld>
             <a:endParaRPr lang="fr-FR" dirty="0"/>
           </a:p>
@@ -8603,7 +9585,7 @@
           <a:lstStyle/>
           <a:p>
             <a:r>
-              <a:rPr lang="fr-FR" smtClean="0"/>
+              <a:rPr lang="fr-FR" dirty="0" smtClean="0"/>
               <a:t>Python pour la biologie</a:t>
             </a:r>
             <a:endParaRPr lang="fr-FR" dirty="0"/>
@@ -8642,8 +9624,8 @@
         </p:nvSpPr>
         <p:spPr>
           <a:xfrm>
-            <a:off x="279400" y="1539081"/>
-            <a:ext cx="8644466" cy="5078312"/>
+            <a:off x="279400" y="1822581"/>
+            <a:ext cx="8644466" cy="4708980"/>
           </a:xfrm>
           <a:prstGeom prst="rect">
             <a:avLst/>
@@ -8672,164 +9654,232 @@
           </a:lstStyle>
           <a:p>
             <a:r>
-              <a:rPr lang="mr-IN" sz="1200" dirty="0"/>
+              <a:rPr lang="mr-IN" sz="1200" dirty="0" smtClean="0">
+                <a:latin typeface="Arial"/>
+                <a:cs typeface="Arial"/>
+              </a:rPr>
               <a:t># STOCKHOLM 1.0</a:t>
             </a:r>
           </a:p>
           <a:p>
             <a:r>
-              <a:rPr lang="mr-IN" sz="1200" dirty="0"/>
+              <a:rPr lang="mr-IN" sz="1200" dirty="0" smtClean="0">
+                <a:latin typeface="Arial"/>
+                <a:cs typeface="Arial"/>
+              </a:rPr>
               <a:t>#=GS COATB_BPIKE/30-81 AC P03620.1</a:t>
             </a:r>
           </a:p>
           <a:p>
             <a:r>
-              <a:rPr lang="mr-IN" sz="1200" dirty="0"/>
+              <a:rPr lang="mr-IN" sz="1200" dirty="0" smtClean="0">
+                <a:latin typeface="Arial"/>
+                <a:cs typeface="Arial"/>
+              </a:rPr>
               <a:t>#=GS COATB_BPIKE/30-81 DR PDB; 1ifl ; 1-52;</a:t>
             </a:r>
           </a:p>
           <a:p>
             <a:r>
-              <a:rPr lang="mr-IN" sz="1200" dirty="0"/>
+              <a:rPr lang="mr-IN" sz="1200" dirty="0" smtClean="0">
+                <a:latin typeface="Arial"/>
+                <a:cs typeface="Arial"/>
+              </a:rPr>
               <a:t>#=GS Q9T0Q8_BPIKE/1-52 AC Q9T0Q8.1</a:t>
             </a:r>
           </a:p>
           <a:p>
             <a:r>
-              <a:rPr lang="mr-IN" sz="1200" dirty="0"/>
+              <a:rPr lang="mr-IN" sz="1200" dirty="0" smtClean="0">
+                <a:latin typeface="Arial"/>
+                <a:cs typeface="Arial"/>
+              </a:rPr>
               <a:t>#=GS COATB_BPI22/32-83 AC P15416.1</a:t>
             </a:r>
           </a:p>
           <a:p>
             <a:r>
-              <a:rPr lang="mr-IN" sz="1200" dirty="0"/>
+              <a:rPr lang="mr-IN" sz="1200" dirty="0" smtClean="0">
+                <a:latin typeface="Arial"/>
+                <a:cs typeface="Arial"/>
+              </a:rPr>
               <a:t>#=GS COATB_BPM13/24-72 AC P69541.1</a:t>
             </a:r>
           </a:p>
           <a:p>
             <a:r>
-              <a:rPr lang="mr-IN" sz="1200" dirty="0"/>
+              <a:rPr lang="mr-IN" sz="1200" dirty="0" smtClean="0">
+                <a:latin typeface="Arial"/>
+                <a:cs typeface="Arial"/>
+              </a:rPr>
               <a:t>#=GS COATB_BPM13/24-72 DR PDB; 2cpb ; 1-49;</a:t>
             </a:r>
           </a:p>
           <a:p>
             <a:r>
-              <a:rPr lang="mr-IN" sz="1200" dirty="0"/>
+              <a:rPr lang="mr-IN" sz="1200" dirty="0" smtClean="0">
+                <a:latin typeface="Arial"/>
+                <a:cs typeface="Arial"/>
+              </a:rPr>
               <a:t>#=GS COATB_BPM13/24-72 DR PDB; 2cps ; 1-49;</a:t>
             </a:r>
           </a:p>
           <a:p>
             <a:r>
-              <a:rPr lang="mr-IN" sz="1200" dirty="0"/>
+              <a:rPr lang="mr-IN" sz="1200" dirty="0" smtClean="0">
+                <a:latin typeface="Arial"/>
+                <a:cs typeface="Arial"/>
+              </a:rPr>
               <a:t>#=GS COATB_BPZJ2/1-49 AC P03618.1</a:t>
             </a:r>
           </a:p>
           <a:p>
             <a:r>
-              <a:rPr lang="mr-IN" sz="1200" dirty="0"/>
+              <a:rPr lang="mr-IN" sz="1200" dirty="0" smtClean="0">
+                <a:latin typeface="Arial"/>
+                <a:cs typeface="Arial"/>
+              </a:rPr>
               <a:t>#=GS Q9T0Q9_BPFD/1-49 AC Q9T0Q9.1</a:t>
             </a:r>
           </a:p>
           <a:p>
             <a:r>
-              <a:rPr lang="mr-IN" sz="1200" dirty="0"/>
+              <a:rPr lang="mr-IN" sz="1200" dirty="0" smtClean="0">
+                <a:latin typeface="Arial"/>
+                <a:cs typeface="Arial"/>
+              </a:rPr>
               <a:t>#=GS Q9T0Q9_BPFD/1-49 DR PDB; 1nh4 A; 1-49;</a:t>
             </a:r>
           </a:p>
           <a:p>
             <a:r>
-              <a:rPr lang="mr-IN" sz="1200" dirty="0"/>
+              <a:rPr lang="mr-IN" sz="1200" dirty="0" smtClean="0">
+                <a:latin typeface="Arial"/>
+                <a:cs typeface="Arial"/>
+              </a:rPr>
               <a:t>#=GS COATB_BPIF1/22-73 AC P03619.2</a:t>
             </a:r>
           </a:p>
           <a:p>
             <a:r>
-              <a:rPr lang="mr-IN" sz="1200" dirty="0"/>
+              <a:rPr lang="mr-IN" sz="1200" dirty="0" smtClean="0">
+                <a:latin typeface="Arial"/>
+                <a:cs typeface="Arial"/>
+              </a:rPr>
               <a:t>#=GS COATB_BPIF1/22-73 DR PDB; 1ifk ; 1-50;</a:t>
             </a:r>
           </a:p>
           <a:p>
             <a:r>
-              <a:rPr lang="mr-IN" sz="1200" dirty="0"/>
+              <a:rPr lang="mr-IN" sz="1200" dirty="0" smtClean="0">
+                <a:latin typeface="Arial"/>
+                <a:cs typeface="Arial"/>
+              </a:rPr>
               <a:t>COATB_BPIKE/30-81 AEPNAATNYATEAMDSLKTQAIDLISQTWPVVTTVVVAGLVIRLFKKFSSKA</a:t>
             </a:r>
           </a:p>
           <a:p>
             <a:r>
-              <a:rPr lang="mr-IN" sz="1200" dirty="0"/>
+              <a:rPr lang="mr-IN" sz="1200" dirty="0" smtClean="0">
+                <a:latin typeface="Arial"/>
+                <a:cs typeface="Arial"/>
+              </a:rPr>
               <a:t>#=GR COATB_BPIKE/30-81 SS -HHHHHHHHHHHHHH--HHHHHHHH--HHHHHHHHHHHHHHHHHHHHH----</a:t>
             </a:r>
           </a:p>
           <a:p>
             <a:r>
-              <a:rPr lang="mr-IN" sz="1200" dirty="0"/>
+              <a:rPr lang="mr-IN" sz="1200" dirty="0" smtClean="0">
+                <a:latin typeface="Arial"/>
+                <a:cs typeface="Arial"/>
+              </a:rPr>
               <a:t>Q9T0Q8_BPIKE/1-52 AEPNAATNYATEAMDSLKTQAIDLISQTWPVVTTVVVAGLVIKLFKKFVSRA</a:t>
             </a:r>
           </a:p>
           <a:p>
             <a:r>
-              <a:rPr lang="mr-IN" sz="1200" dirty="0"/>
+              <a:rPr lang="mr-IN" sz="1200" dirty="0" smtClean="0">
+                <a:latin typeface="Arial"/>
+                <a:cs typeface="Arial"/>
+              </a:rPr>
               <a:t>COATB_BPI22/32-83 DGTSTATSYATEAMNSLKTQATDLIDQTWPVVTSVAVAGLAIRLFKKFSSKA</a:t>
             </a:r>
           </a:p>
           <a:p>
             <a:r>
-              <a:rPr lang="mr-IN" sz="1200" dirty="0"/>
-              <a:t>COATB_BPM13/24-72 AEGDDP...AKAAFNSLQASATEYIGYAWAMVVVIVGATIGIKLFKKFTSKA</a:t>
-            </a:r>
-          </a:p>
-          <a:p>
-            <a:r>
-              <a:rPr lang="mr-IN" sz="1200" dirty="0"/>
+              <a:rPr lang="mr-IN" sz="1200" dirty="0" smtClean="0">
+                <a:latin typeface="Arial"/>
+                <a:cs typeface="Arial"/>
+              </a:rPr>
               <a:t>#=GR COATB_BPM13/24-72 SS ---S-T...CHCHHHHCCCCTCCCTTCHHHHHHHHHHHHHHHHHHHHCTT--</a:t>
             </a:r>
           </a:p>
           <a:p>
             <a:r>
-              <a:rPr lang="mr-IN" sz="1200" dirty="0"/>
+              <a:rPr lang="mr-IN" sz="1200" dirty="0" smtClean="0">
+                <a:latin typeface="Arial"/>
+                <a:cs typeface="Arial"/>
+              </a:rPr>
               <a:t>COATB_BPZJ2/1-49 AEGDDP...AKAAFDSLQASATEYIGYAWAMVVVIVGATIGIKLFKKFASKA</a:t>
             </a:r>
           </a:p>
           <a:p>
             <a:r>
-              <a:rPr lang="mr-IN" sz="1200" dirty="0"/>
+              <a:rPr lang="mr-IN" sz="1200" dirty="0" smtClean="0">
+                <a:latin typeface="Arial"/>
+                <a:cs typeface="Arial"/>
+              </a:rPr>
               <a:t>Q9T0Q9_BPFD/1-49 AEGDDP...AKAAFDSLQASATEYIGYAWAMVVVIVGATIGIKLFKKFTSKA</a:t>
             </a:r>
           </a:p>
           <a:p>
             <a:r>
-              <a:rPr lang="mr-IN" sz="1200" dirty="0"/>
+              <a:rPr lang="mr-IN" sz="1200" dirty="0" smtClean="0">
+                <a:latin typeface="Arial"/>
+                <a:cs typeface="Arial"/>
+              </a:rPr>
               <a:t>#=GR Q9T0Q9_BPFD/1-49 SS ------...-HHHHHHHHHHHHHHHHHHHHHHHHHHHHHHHHHHHHHHHH--</a:t>
             </a:r>
           </a:p>
           <a:p>
             <a:r>
-              <a:rPr lang="mr-IN" sz="1200" dirty="0"/>
+              <a:rPr lang="mr-IN" sz="1200" dirty="0" smtClean="0">
+                <a:latin typeface="Arial"/>
+                <a:cs typeface="Arial"/>
+              </a:rPr>
               <a:t>COATB_BPIF1/22-73 FAADDATSQAKAAFDSLTAQATEMSGYAWALVVLVVGATVGIKLFKKFVSRA</a:t>
             </a:r>
           </a:p>
           <a:p>
             <a:r>
-              <a:rPr lang="mr-IN" sz="1200" dirty="0"/>
+              <a:rPr lang="mr-IN" sz="1200" dirty="0" smtClean="0">
+                <a:latin typeface="Arial"/>
+                <a:cs typeface="Arial"/>
+              </a:rPr>
               <a:t>#=GR COATB_BPIF1/22-73 SS XX-HHHH--HHHHHH--HHHHHHH--HHHHHHHHHHHHHHHHHHHHHHH---</a:t>
             </a:r>
           </a:p>
           <a:p>
             <a:r>
-              <a:rPr lang="mr-IN" sz="1200" dirty="0"/>
+              <a:rPr lang="mr-IN" sz="1200" dirty="0" smtClean="0">
+                <a:latin typeface="Arial"/>
+                <a:cs typeface="Arial"/>
+              </a:rPr>
               <a:t>#=GC SS_cons XHHHHHHHHHHHHHHHCHHHHHHHHCHHHHHHHHHHHHHHHHHHHHHHHC--</a:t>
             </a:r>
           </a:p>
           <a:p>
             <a:r>
-              <a:rPr lang="mr-IN" sz="1200" dirty="0"/>
-              <a:t>#=GC seq_cons AEssss...AptAhDSLpspAT-</a:t>
-            </a:r>
-            <a:r>
-              <a:rPr lang="mr-IN" sz="1200" dirty="0" smtClean="0"/>
-              <a:t>hIu.sWshVsslVsAsluIKLFKKFsSKA</a:t>
-            </a:r>
-            <a:endParaRPr lang="mr-IN" sz="1200" dirty="0"/>
+              <a:rPr lang="mr-IN" sz="1200" dirty="0" smtClean="0">
+                <a:latin typeface="Arial"/>
+                <a:cs typeface="Arial"/>
+              </a:rPr>
+              <a:t>#=GC seq_cons AEssss...AptAhDSLpspAT-hIu.sWshVsslVsAsluIKLFKKFsSK</a:t>
+            </a:r>
+            <a:endParaRPr lang="fr-FR" sz="1200" dirty="0" smtClean="0">
+              <a:latin typeface="Arial"/>
+              <a:cs typeface="Arial"/>
+            </a:endParaRPr>
           </a:p>
         </p:txBody>
       </p:sp>
@@ -8878,30 +9928,14 @@
           <a:bodyPr/>
           <a:lstStyle/>
           <a:p>
-            <a:endParaRPr lang="fr-FR"/>
-          </a:p>
-        </p:txBody>
-      </p:sp>
-      <p:sp>
-        <p:nvSpPr>
-          <p:cNvPr id="3" name="Espace réservé du contenu 2"/>
-          <p:cNvSpPr>
-            <a:spLocks noGrp="1"/>
-          </p:cNvSpPr>
-          <p:nvPr>
-            <p:ph idx="1"/>
-          </p:nvPr>
-        </p:nvSpPr>
-        <p:spPr>
-          <a:xfrm>
-            <a:off x="279400" y="1236134"/>
-            <a:ext cx="8644466" cy="476240"/>
-          </a:xfrm>
-        </p:spPr>
-        <p:txBody>
-          <a:bodyPr/>
-          <a:lstStyle/>
-          <a:p>
+            <a:r>
+              <a:rPr lang="en-US" dirty="0"/>
+              <a:t>Single </a:t>
+            </a:r>
+            <a:r>
+              <a:rPr lang="en-US" dirty="0" smtClean="0"/>
+              <a:t>Alignments (2)</a:t>
+            </a:r>
             <a:endParaRPr lang="fr-FR" dirty="0"/>
           </a:p>
         </p:txBody>
@@ -8923,7 +9957,7 @@
           <a:p>
             <a:fld id="{751463B9-2A29-154C-A5AC-383AEA094CA9}" type="datetime1">
               <a:rPr lang="fr-FR" smtClean="0"/>
-              <a:t>06/11/16</a:t>
+              <a:t>08/11/16</a:t>
             </a:fld>
             <a:endParaRPr lang="fr-FR" dirty="0"/>
           </a:p>
@@ -8984,7 +10018,7 @@
         </p:nvSpPr>
         <p:spPr>
           <a:xfrm>
-            <a:off x="279400" y="1712374"/>
+            <a:off x="279400" y="1168043"/>
             <a:ext cx="8644466" cy="461665"/>
           </a:xfrm>
           <a:prstGeom prst="rect">
@@ -9055,7 +10089,7 @@
         </p:nvSpPr>
         <p:spPr>
           <a:xfrm>
-            <a:off x="279400" y="2189453"/>
+            <a:off x="279400" y="1826565"/>
             <a:ext cx="8644466" cy="1754327"/>
           </a:xfrm>
           <a:prstGeom prst="rect">
@@ -9091,53 +10125,89 @@
           </a:p>
           <a:p>
             <a:r>
-              <a:rPr lang="en-US" sz="1200" dirty="0" err="1"/>
+              <a:rPr lang="en-US" sz="1200" dirty="0" err="1">
+                <a:solidFill>
+                  <a:srgbClr val="FF0000"/>
+                </a:solidFill>
+              </a:rPr>
               <a:t>SingleLetterAlphabet</a:t>
             </a:r>
             <a:r>
-              <a:rPr lang="en-US" sz="1200" dirty="0"/>
+              <a:rPr lang="en-US" sz="1200" dirty="0">
+                <a:solidFill>
+                  <a:srgbClr val="FF0000"/>
+                </a:solidFill>
+              </a:rPr>
               <a:t>() alignment with 7 rows and 52 columns</a:t>
             </a:r>
           </a:p>
           <a:p>
             <a:r>
-              <a:rPr lang="en-US" sz="1200" dirty="0"/>
+              <a:rPr lang="en-US" sz="1200" dirty="0">
+                <a:solidFill>
+                  <a:srgbClr val="FF0000"/>
+                </a:solidFill>
+              </a:rPr>
               <a:t>AEPNAATNYATEAMDSLKTQAIDLISQTWPVVTTVVVAGLVIRL...SKA COATB_BPIKE/30-81</a:t>
             </a:r>
           </a:p>
           <a:p>
             <a:r>
-              <a:rPr lang="en-US" sz="1200" dirty="0"/>
+              <a:rPr lang="en-US" sz="1200" dirty="0">
+                <a:solidFill>
+                  <a:srgbClr val="FF0000"/>
+                </a:solidFill>
+              </a:rPr>
               <a:t>AEPNAATNYATEAMDSLKTQAIDLISQTWPVVTTVVVAGLVIKL...SRA Q9T0Q8_BPIKE/1-52</a:t>
             </a:r>
           </a:p>
           <a:p>
             <a:r>
-              <a:rPr lang="en-US" sz="1200" dirty="0"/>
+              <a:rPr lang="en-US" sz="1200" dirty="0">
+                <a:solidFill>
+                  <a:srgbClr val="FF0000"/>
+                </a:solidFill>
+              </a:rPr>
               <a:t>DGTSTATSYATEAMNSLKTQATDLIDQTWPVVTSVAVAGLAIRL...SKA COATB_BPI22/32-83</a:t>
             </a:r>
           </a:p>
           <a:p>
             <a:r>
-              <a:rPr lang="en-US" sz="1200" dirty="0"/>
+              <a:rPr lang="en-US" sz="1200" dirty="0">
+                <a:solidFill>
+                  <a:srgbClr val="FF0000"/>
+                </a:solidFill>
+              </a:rPr>
               <a:t>AEGDDP---AKAAFNSLQASATEYIGYAWAMVVVIVGATIGIKL...SKA COATB_BPM13/24-72</a:t>
             </a:r>
           </a:p>
           <a:p>
             <a:r>
-              <a:rPr lang="en-US" sz="1200" dirty="0"/>
+              <a:rPr lang="en-US" sz="1200" dirty="0">
+                <a:solidFill>
+                  <a:srgbClr val="FF0000"/>
+                </a:solidFill>
+              </a:rPr>
               <a:t>AEGDDP---AKAAFDSLQASATEYIGYAWAMVVVIVGATIGIKL...SKA COATB_BPZJ2/1-49</a:t>
             </a:r>
           </a:p>
           <a:p>
             <a:r>
-              <a:rPr lang="en-US" sz="1200" dirty="0"/>
+              <a:rPr lang="en-US" sz="1200" dirty="0">
+                <a:solidFill>
+                  <a:srgbClr val="FF0000"/>
+                </a:solidFill>
+              </a:rPr>
               <a:t>AEGDDP---AKAAFDSLQASATEYIGYAWAMVVVIVGATIGIKL...SKA Q9T0Q9_BPFD/1-49</a:t>
             </a:r>
           </a:p>
           <a:p>
             <a:r>
-              <a:rPr lang="en-US" sz="1200" dirty="0"/>
+              <a:rPr lang="en-US" sz="1200" dirty="0">
+                <a:solidFill>
+                  <a:srgbClr val="FF0000"/>
+                </a:solidFill>
+              </a:rPr>
               <a:t>FAADDATSQAKAAFDSLTAQATEMSGYAWALVVLVVGATVGIKL...SRA COATB_BPIF1/22-73</a:t>
             </a:r>
           </a:p>
@@ -9151,7 +10221,7 @@
         </p:nvSpPr>
         <p:spPr>
           <a:xfrm>
-            <a:off x="279400" y="4067526"/>
+            <a:off x="279400" y="3806701"/>
             <a:ext cx="8644466" cy="2523768"/>
           </a:xfrm>
           <a:prstGeom prst="rect">
@@ -9270,43 +10340,71 @@
           </a:p>
           <a:p>
             <a:r>
-              <a:rPr lang="en-US" sz="1200" dirty="0"/>
+              <a:rPr lang="en-US" sz="1200" dirty="0">
+                <a:solidFill>
+                  <a:srgbClr val="FF0000"/>
+                </a:solidFill>
+              </a:rPr>
               <a:t>AEPNAATNYATEAMDSLKTQAIDLISQTWPVVTTVVVAGLVIRLFKKFSSKA - COATB_BPIKE/30-81</a:t>
             </a:r>
           </a:p>
           <a:p>
             <a:r>
-              <a:rPr lang="en-US" sz="1200" dirty="0"/>
+              <a:rPr lang="en-US" sz="1200" dirty="0">
+                <a:solidFill>
+                  <a:srgbClr val="FF0000"/>
+                </a:solidFill>
+              </a:rPr>
               <a:t>AEPNAATNYATEAMDSLKTQAIDLISQTWPVVTTVVVAGLVIKLFKKFVSRA - Q9T0Q8_BPIKE/1-52</a:t>
             </a:r>
           </a:p>
           <a:p>
             <a:r>
-              <a:rPr lang="en-US" sz="1200" dirty="0"/>
+              <a:rPr lang="en-US" sz="1200" dirty="0">
+                <a:solidFill>
+                  <a:srgbClr val="FF0000"/>
+                </a:solidFill>
+              </a:rPr>
               <a:t>DGTSTATSYATEAMNSLKTQATDLIDQTWPVVTSVAVAGLAIRLFKKFSSKA - COATB_BPI22/32-83</a:t>
             </a:r>
           </a:p>
           <a:p>
             <a:r>
-              <a:rPr lang="en-US" sz="1200" dirty="0"/>
+              <a:rPr lang="en-US" sz="1200" dirty="0">
+                <a:solidFill>
+                  <a:srgbClr val="FF0000"/>
+                </a:solidFill>
+              </a:rPr>
               <a:t>AEGDDP---AKAAFNSLQASATEYIGYAWAMVVVIVGATIGIKLFKKFTSKA - COATB_BPM13/24-72</a:t>
             </a:r>
           </a:p>
           <a:p>
             <a:r>
-              <a:rPr lang="en-US" sz="1200" dirty="0"/>
+              <a:rPr lang="en-US" sz="1200" dirty="0">
+                <a:solidFill>
+                  <a:srgbClr val="FF0000"/>
+                </a:solidFill>
+              </a:rPr>
               <a:t>AEGDDP---AKAAFDSLQASATEYIGYAWAMVVVIVGATIGIKLFKKFASKA - COATB_BPZJ2/1-49</a:t>
             </a:r>
           </a:p>
           <a:p>
             <a:r>
-              <a:rPr lang="en-US" sz="1200" dirty="0"/>
+              <a:rPr lang="en-US" sz="1200" dirty="0">
+                <a:solidFill>
+                  <a:srgbClr val="FF0000"/>
+                </a:solidFill>
+              </a:rPr>
               <a:t>AEGDDP---AKAAFDSLQASATEYIGYAWAMVVVIVGATIGIKLFKKFTSKA - Q9T0Q9_BPFD/1-49</a:t>
             </a:r>
           </a:p>
           <a:p>
             <a:r>
-              <a:rPr lang="en-US" sz="1200" dirty="0"/>
+              <a:rPr lang="en-US" sz="1200" dirty="0">
+                <a:solidFill>
+                  <a:srgbClr val="FF0000"/>
+                </a:solidFill>
+              </a:rPr>
               <a:t>FAADDATSQAKAAFDSLTAQATEMSGYAWALVVLVVGATVGIKLFKKFVSRA - COATB_BPIF1/22-73</a:t>
             </a:r>
           </a:p>
@@ -9357,7 +10455,15 @@
           <a:bodyPr/>
           <a:lstStyle/>
           <a:p>
-            <a:endParaRPr lang="fr-FR"/>
+            <a:r>
+              <a:rPr lang="en-US" dirty="0"/>
+              <a:t>Single Alignments </a:t>
+            </a:r>
+            <a:r>
+              <a:rPr lang="en-US" dirty="0" smtClean="0"/>
+              <a:t>(3)</a:t>
+            </a:r>
+            <a:endParaRPr lang="fr-FR" dirty="0"/>
           </a:p>
         </p:txBody>
       </p:sp>
@@ -9373,7 +10479,7 @@
         </p:nvSpPr>
         <p:spPr>
           <a:xfrm>
-            <a:off x="279400" y="1236134"/>
+            <a:off x="279400" y="941294"/>
             <a:ext cx="8644466" cy="487580"/>
           </a:xfrm>
         </p:spPr>
@@ -9381,7 +10487,33 @@
           <a:bodyPr/>
           <a:lstStyle/>
           <a:p>
-            <a:endParaRPr lang="fr-FR"/>
+            <a:r>
+              <a:rPr lang="en-US" dirty="0" smtClean="0"/>
+              <a:t>Include </a:t>
+            </a:r>
+            <a:r>
+              <a:rPr lang="en-US" dirty="0"/>
+              <a:t>database cross-references to </a:t>
+            </a:r>
+            <a:r>
+              <a:rPr lang="en-US" dirty="0" smtClean="0"/>
+              <a:t>the PDB </a:t>
+            </a:r>
+            <a:r>
+              <a:rPr lang="en-US" dirty="0"/>
+              <a:t>and the </a:t>
+            </a:r>
+            <a:r>
+              <a:rPr lang="en-US" dirty="0" smtClean="0"/>
+              <a:t>associate known </a:t>
+            </a:r>
+            <a:r>
+              <a:rPr lang="en-US" dirty="0"/>
+              <a:t>secondary structure</a:t>
+            </a:r>
+          </a:p>
+          <a:p>
+            <a:endParaRPr lang="fr-FR" dirty="0"/>
           </a:p>
         </p:txBody>
       </p:sp>
@@ -9402,7 +10534,7 @@
           <a:p>
             <a:fld id="{751463B9-2A29-154C-A5AC-383AEA094CA9}" type="datetime1">
               <a:rPr lang="fr-FR" smtClean="0"/>
-              <a:t>06/11/16</a:t>
+              <a:t>08/11/16</a:t>
             </a:fld>
             <a:endParaRPr lang="fr-FR" dirty="0"/>
           </a:p>
@@ -9493,43 +10625,76 @@
           </a:lstStyle>
           <a:p>
             <a:r>
-              <a:rPr lang="mr-IN" sz="1200" dirty="0"/>
+              <a:rPr lang="mr-IN" sz="1200" dirty="0">
+                <a:latin typeface="Arial"/>
+                <a:cs typeface="Arial"/>
+              </a:rPr>
               <a:t>&gt;&gt;&gt; for record in alignment:</a:t>
             </a:r>
           </a:p>
           <a:p>
             <a:r>
-              <a:rPr lang="mr-IN" sz="1200" dirty="0"/>
+              <a:rPr lang="mr-IN" sz="1200" dirty="0">
+                <a:latin typeface="Arial"/>
+                <a:cs typeface="Arial"/>
+              </a:rPr>
               <a:t>... if record.dbxrefs:</a:t>
             </a:r>
           </a:p>
           <a:p>
             <a:r>
-              <a:rPr lang="mr-IN" sz="1200" dirty="0"/>
+              <a:rPr lang="mr-IN" sz="1200" dirty="0">
+                <a:latin typeface="Arial"/>
+                <a:cs typeface="Arial"/>
+              </a:rPr>
               <a:t>... print("%s %s" % (record.id, record.dbxrefs))</a:t>
             </a:r>
           </a:p>
           <a:p>
             <a:r>
-              <a:rPr lang="mr-IN" sz="1200" dirty="0"/>
+              <a:rPr lang="mr-IN" sz="1200" dirty="0">
+                <a:solidFill>
+                  <a:srgbClr val="FF0000"/>
+                </a:solidFill>
+                <a:latin typeface="Arial"/>
+                <a:cs typeface="Arial"/>
+              </a:rPr>
               <a:t>COATB_BPIKE/30-81 ['PDB; 1ifl ; 1-52;']</a:t>
             </a:r>
           </a:p>
           <a:p>
             <a:r>
-              <a:rPr lang="mr-IN" sz="1200" dirty="0"/>
+              <a:rPr lang="mr-IN" sz="1200" dirty="0">
+                <a:solidFill>
+                  <a:srgbClr val="FF0000"/>
+                </a:solidFill>
+                <a:latin typeface="Arial"/>
+                <a:cs typeface="Arial"/>
+              </a:rPr>
               <a:t>COATB_BPM13/24-72 ['PDB; 2cpb ; 1-49;', 'PDB; 2cps ; 1-49;']</a:t>
             </a:r>
           </a:p>
           <a:p>
             <a:r>
-              <a:rPr lang="mr-IN" sz="1200" dirty="0"/>
+              <a:rPr lang="mr-IN" sz="1200" dirty="0">
+                <a:solidFill>
+                  <a:srgbClr val="FF0000"/>
+                </a:solidFill>
+                <a:latin typeface="Arial"/>
+                <a:cs typeface="Arial"/>
+              </a:rPr>
               <a:t>Q9T0Q9_BPFD/1-49 ['PDB; 1nh4 A; 1-49;']</a:t>
             </a:r>
           </a:p>
           <a:p>
             <a:r>
-              <a:rPr lang="mr-IN" sz="1200" dirty="0"/>
+              <a:rPr lang="mr-IN" sz="1200" dirty="0">
+                <a:solidFill>
+                  <a:srgbClr val="FF0000"/>
+                </a:solidFill>
+                <a:latin typeface="Arial"/>
+                <a:cs typeface="Arial"/>
+              </a:rPr>
               <a:t>COATB_BPIF1/22-73 ['PDB; 1ifk ; 1-50;']</a:t>
             </a:r>
           </a:p>
@@ -9623,85 +10788,141 @@
           </a:lstStyle>
           <a:p>
             <a:r>
-              <a:rPr lang="tr-TR" sz="1200" dirty="0"/>
+              <a:rPr lang="tr-TR" sz="1200" dirty="0">
+                <a:solidFill>
+                  <a:srgbClr val="FF0000"/>
+                </a:solidFill>
+              </a:rPr>
               <a:t>&gt;COATB_BPIKE/30-81</a:t>
             </a:r>
           </a:p>
           <a:p>
             <a:r>
-              <a:rPr lang="tr-TR" sz="1200" dirty="0"/>
+              <a:rPr lang="tr-TR" sz="1200" dirty="0">
+                <a:solidFill>
+                  <a:srgbClr val="FF0000"/>
+                </a:solidFill>
+              </a:rPr>
               <a:t>AEPNAATNYATEAMDSLKTQAIDLISQTWPVVTTVVVAGLVIRLFKKFSSKA</a:t>
             </a:r>
           </a:p>
           <a:p>
             <a:r>
-              <a:rPr lang="tr-TR" sz="1200" dirty="0"/>
+              <a:rPr lang="tr-TR" sz="1200" dirty="0">
+                <a:solidFill>
+                  <a:srgbClr val="FF0000"/>
+                </a:solidFill>
+              </a:rPr>
               <a:t>&gt;Q9T0Q8_BPIKE/1-52</a:t>
             </a:r>
           </a:p>
           <a:p>
             <a:r>
-              <a:rPr lang="tr-TR" sz="1200" dirty="0"/>
+              <a:rPr lang="tr-TR" sz="1200" dirty="0">
+                <a:solidFill>
+                  <a:srgbClr val="FF0000"/>
+                </a:solidFill>
+              </a:rPr>
               <a:t>AEPNAATNYATEAMDSLKTQAIDLISQTWPVVTTVVVAGLVIKLFKKFVSRA</a:t>
             </a:r>
           </a:p>
           <a:p>
             <a:r>
-              <a:rPr lang="tr-TR" sz="1200" dirty="0"/>
+              <a:rPr lang="tr-TR" sz="1200" dirty="0">
+                <a:solidFill>
+                  <a:srgbClr val="FF0000"/>
+                </a:solidFill>
+              </a:rPr>
               <a:t>&gt;COATB_BPI22/32-83</a:t>
             </a:r>
           </a:p>
           <a:p>
             <a:r>
-              <a:rPr lang="tr-TR" sz="1200" dirty="0"/>
+              <a:rPr lang="tr-TR" sz="1200" dirty="0">
+                <a:solidFill>
+                  <a:srgbClr val="FF0000"/>
+                </a:solidFill>
+              </a:rPr>
               <a:t>DGTSTATSYATEAMNSLKTQATDLIDQTWPVVTSVAVAGLAIRLFKKFSSKA</a:t>
             </a:r>
           </a:p>
           <a:p>
             <a:r>
-              <a:rPr lang="tr-TR" sz="1200" dirty="0"/>
+              <a:rPr lang="tr-TR" sz="1200" dirty="0">
+                <a:solidFill>
+                  <a:srgbClr val="FF0000"/>
+                </a:solidFill>
+              </a:rPr>
               <a:t>&gt;COATB_BPM13/24-72</a:t>
             </a:r>
           </a:p>
           <a:p>
             <a:r>
-              <a:rPr lang="tr-TR" sz="1200" dirty="0"/>
+              <a:rPr lang="tr-TR" sz="1200" dirty="0">
+                <a:solidFill>
+                  <a:srgbClr val="FF0000"/>
+                </a:solidFill>
+              </a:rPr>
               <a:t>AEGDDP---AKAAFNSLQASATEYIGYAWAMVVVIVGATIGIKLFKKFTSKA</a:t>
             </a:r>
           </a:p>
           <a:p>
             <a:r>
-              <a:rPr lang="tr-TR" sz="1200" dirty="0"/>
+              <a:rPr lang="tr-TR" sz="1200" dirty="0">
+                <a:solidFill>
+                  <a:srgbClr val="FF0000"/>
+                </a:solidFill>
+              </a:rPr>
               <a:t>&gt;COATB_BPZJ2/1-49</a:t>
             </a:r>
           </a:p>
           <a:p>
             <a:r>
-              <a:rPr lang="tr-TR" sz="1200" dirty="0"/>
+              <a:rPr lang="tr-TR" sz="1200" dirty="0">
+                <a:solidFill>
+                  <a:srgbClr val="FF0000"/>
+                </a:solidFill>
+              </a:rPr>
               <a:t>AEGDDP---AKAAFDSLQASATEYIGYAWAMVVVIVGATIGIKLFKKFASKA</a:t>
             </a:r>
           </a:p>
           <a:p>
             <a:r>
-              <a:rPr lang="tr-TR" sz="1200" dirty="0"/>
+              <a:rPr lang="tr-TR" sz="1200" dirty="0">
+                <a:solidFill>
+                  <a:srgbClr val="FF0000"/>
+                </a:solidFill>
+              </a:rPr>
               <a:t>&gt;Q9T0Q9_BPFD/1-49</a:t>
             </a:r>
           </a:p>
           <a:p>
             <a:r>
-              <a:rPr lang="tr-TR" sz="1200" dirty="0"/>
+              <a:rPr lang="tr-TR" sz="1200" dirty="0">
+                <a:solidFill>
+                  <a:srgbClr val="FF0000"/>
+                </a:solidFill>
+              </a:rPr>
               <a:t>AEGDDP---AKAAFDSLQASATEYIGYAWAMVVVIVGATIGIKLFKKFTSKA</a:t>
             </a:r>
           </a:p>
           <a:p>
             <a:r>
-              <a:rPr lang="tr-TR" sz="1200" dirty="0"/>
+              <a:rPr lang="tr-TR" sz="1200" dirty="0">
+                <a:solidFill>
+                  <a:srgbClr val="FF0000"/>
+                </a:solidFill>
+              </a:rPr>
               <a:t>&gt;COATB_BPIF1/22-73</a:t>
             </a:r>
           </a:p>
           <a:p>
             <a:r>
-              <a:rPr lang="tr-TR" sz="1200" dirty="0"/>
+              <a:rPr lang="tr-TR" sz="1200" dirty="0">
+                <a:solidFill>
+                  <a:srgbClr val="FF0000"/>
+                </a:solidFill>
+              </a:rPr>
               <a:t>FAADDATSQAKAAFDSLTAQATEMSGYAWALVVLVVGATVGIKLFKKFVSRA</a:t>
             </a:r>
           </a:p>
@@ -9752,7 +10973,15 @@
           <a:bodyPr/>
           <a:lstStyle/>
           <a:p>
-            <a:endParaRPr lang="fr-FR"/>
+            <a:r>
+              <a:rPr lang="en-US" dirty="0"/>
+              <a:t>Single Alignments </a:t>
+            </a:r>
+            <a:r>
+              <a:rPr lang="en-US" dirty="0" smtClean="0"/>
+              <a:t>(4)</a:t>
+            </a:r>
+            <a:endParaRPr lang="fr-FR" dirty="0"/>
           </a:p>
         </p:txBody>
       </p:sp>
@@ -9769,7 +10998,7 @@
         <p:spPr>
           <a:xfrm>
             <a:off x="279400" y="1236134"/>
-            <a:ext cx="8644466" cy="986550"/>
+            <a:ext cx="8644466" cy="555621"/>
           </a:xfrm>
         </p:spPr>
         <p:txBody>
@@ -9778,13 +11007,21 @@
           <a:p>
             <a:r>
               <a:rPr lang="en-US" dirty="0"/>
-              <a:t>Note the website should have an option about showing gaps as periods (dots) or dashes, we've shown </a:t>
+              <a:t>download and save this as </a:t>
             </a:r>
             <a:r>
               <a:rPr lang="en-US" dirty="0" smtClean="0"/>
-              <a:t>dashes above</a:t>
-            </a:r>
-            <a:endParaRPr lang="en-US" dirty="0"/>
+              <a:t>file “PF05371 </a:t>
+            </a:r>
+            <a:r>
+              <a:rPr lang="en-US" dirty="0" err="1" smtClean="0"/>
+              <a:t>seed.fa</a:t>
+            </a:r>
+            <a:r>
+              <a:rPr lang="en-US" dirty="0" smtClean="0"/>
+              <a:t>”</a:t>
+            </a:r>
+            <a:endParaRPr lang="en-US" dirty="0" smtClean="0"/>
           </a:p>
           <a:p>
             <a:endParaRPr lang="fr-FR" dirty="0"/>
@@ -9808,7 +11045,7 @@
           <a:p>
             <a:fld id="{751463B9-2A29-154C-A5AC-383AEA094CA9}" type="datetime1">
               <a:rPr lang="fr-FR" smtClean="0"/>
-              <a:t>06/11/16</a:t>
+              <a:t>08/11/16</a:t>
             </a:fld>
             <a:endParaRPr lang="fr-FR" dirty="0"/>
           </a:p>
@@ -9869,7 +11106,7 @@
         </p:nvSpPr>
         <p:spPr>
           <a:xfrm>
-            <a:off x="279400" y="2256705"/>
+            <a:off x="279400" y="1791755"/>
             <a:ext cx="8644466" cy="646331"/>
           </a:xfrm>
           <a:prstGeom prst="rect">
@@ -9940,498 +11177,14 @@
       </p:sp>
       <p:sp>
         <p:nvSpPr>
-          <p:cNvPr id="8" name="ZoneTexte 7"/>
-          <p:cNvSpPr txBox="1"/>
-          <p:nvPr/>
-        </p:nvSpPr>
-        <p:spPr>
-          <a:xfrm>
-            <a:off x="279400" y="4166840"/>
-            <a:ext cx="8644466" cy="646331"/>
-          </a:xfrm>
-          <a:prstGeom prst="rect">
-            <a:avLst/>
-          </a:prstGeom>
-          <a:solidFill>
-            <a:schemeClr val="accent2">
-              <a:lumMod val="60000"/>
-              <a:lumOff val="40000"/>
-            </a:schemeClr>
-          </a:solidFill>
-          <a:ln>
-            <a:noFill/>
-          </a:ln>
-        </p:spPr>
-        <p:txBody>
-          <a:bodyPr wrap="square" rtlCol="0">
-            <a:spAutoFit/>
-          </a:bodyPr>
-          <a:lstStyle>
-            <a:defPPr>
-              <a:defRPr lang="fr-FR"/>
-            </a:defPPr>
-            <a:lvl1pPr>
-              <a:defRPr sz="1400"/>
-            </a:lvl1pPr>
-          </a:lstStyle>
-          <a:p>
-            <a:r>
-              <a:rPr lang="en-US" sz="1200" dirty="0"/>
-              <a:t>&gt;&gt;&gt; from Bio import </a:t>
-            </a:r>
-            <a:r>
-              <a:rPr lang="en-US" sz="1200" dirty="0" err="1"/>
-              <a:t>AlignIO</a:t>
-            </a:r>
-            <a:endParaRPr lang="en-US" sz="1200" dirty="0"/>
-          </a:p>
-          <a:p>
-            <a:r>
-              <a:rPr lang="en-US" sz="1200" dirty="0"/>
-              <a:t>&gt;&gt;&gt; help(</a:t>
-            </a:r>
-            <a:r>
-              <a:rPr lang="en-US" sz="1200" dirty="0" err="1"/>
-              <a:t>AlignIO</a:t>
-            </a:r>
-            <a:r>
-              <a:rPr lang="en-US" sz="1200" dirty="0"/>
-              <a:t>)</a:t>
-            </a:r>
-          </a:p>
-          <a:p>
-            <a:r>
-              <a:rPr lang="en-US" sz="1200" dirty="0"/>
-              <a:t>...</a:t>
-            </a:r>
-          </a:p>
-        </p:txBody>
-      </p:sp>
-      <p:sp>
-        <p:nvSpPr>
           <p:cNvPr id="9" name="ZoneTexte 8"/>
           <p:cNvSpPr txBox="1"/>
           <p:nvPr/>
         </p:nvSpPr>
         <p:spPr>
           <a:xfrm>
-            <a:off x="279400" y="3186603"/>
-            <a:ext cx="7318918" cy="369332"/>
-          </a:xfrm>
-          <a:prstGeom prst="rect">
-            <a:avLst/>
-          </a:prstGeom>
-          <a:noFill/>
-        </p:spPr>
-        <p:txBody>
-          <a:bodyPr wrap="none" rtlCol="0">
-            <a:spAutoFit/>
-          </a:bodyPr>
-          <a:lstStyle/>
-          <a:p>
-            <a:r>
-              <a:rPr lang="en-US" dirty="0"/>
-              <a:t>All that has changed in this code is the </a:t>
-            </a:r>
-            <a:r>
-              <a:rPr lang="en-US" dirty="0" smtClean="0"/>
-              <a:t>filename </a:t>
-            </a:r>
-            <a:r>
-              <a:rPr lang="en-US" dirty="0"/>
-              <a:t>and the format string.</a:t>
-            </a:r>
-            <a:endParaRPr lang="fr-FR" dirty="0"/>
-          </a:p>
-        </p:txBody>
-      </p:sp>
-    </p:spTree>
-    <p:extLst>
-      <p:ext uri="{BB962C8B-B14F-4D97-AF65-F5344CB8AC3E}">
-        <p14:creationId xmlns:p14="http://schemas.microsoft.com/office/powerpoint/2010/main" val="843041792"/>
-      </p:ext>
-    </p:extLst>
-  </p:cSld>
-  <p:clrMapOvr>
-    <a:masterClrMapping/>
-  </p:clrMapOvr>
-</p:sld>
-</file>
-
-<file path=ppt/slides/slide9.xml><?xml version="1.0" encoding="utf-8"?>
-<p:sld xmlns:a="http://schemas.openxmlformats.org/drawingml/2006/main" xmlns:r="http://schemas.openxmlformats.org/officeDocument/2006/relationships" xmlns:p="http://schemas.openxmlformats.org/presentationml/2006/main">
-  <p:cSld>
-    <p:spTree>
-      <p:nvGrpSpPr>
-        <p:cNvPr id="1" name=""/>
-        <p:cNvGrpSpPr/>
-        <p:nvPr/>
-      </p:nvGrpSpPr>
-      <p:grpSpPr>
-        <a:xfrm>
-          <a:off x="0" y="0"/>
-          <a:ext cx="0" cy="0"/>
-          <a:chOff x="0" y="0"/>
-          <a:chExt cx="0" cy="0"/>
-        </a:xfrm>
-      </p:grpSpPr>
-      <p:sp>
-        <p:nvSpPr>
-          <p:cNvPr id="2" name="Titre 1"/>
-          <p:cNvSpPr>
-            <a:spLocks noGrp="1"/>
-          </p:cNvSpPr>
-          <p:nvPr>
-            <p:ph type="title"/>
-          </p:nvPr>
-        </p:nvSpPr>
-        <p:spPr/>
-        <p:txBody>
-          <a:bodyPr/>
-          <a:lstStyle/>
-          <a:p>
-            <a:r>
-              <a:rPr lang="fr-FR" dirty="0" smtClean="0"/>
-              <a:t>Multiple </a:t>
-            </a:r>
-            <a:r>
-              <a:rPr lang="fr-FR" dirty="0" err="1" smtClean="0"/>
-              <a:t>alignments</a:t>
-            </a:r>
-            <a:endParaRPr lang="fr-FR" dirty="0"/>
-          </a:p>
-        </p:txBody>
-      </p:sp>
-      <p:sp>
-        <p:nvSpPr>
-          <p:cNvPr id="3" name="Espace réservé du contenu 2"/>
-          <p:cNvSpPr>
-            <a:spLocks noGrp="1"/>
-          </p:cNvSpPr>
-          <p:nvPr>
-            <p:ph idx="1"/>
-          </p:nvPr>
-        </p:nvSpPr>
-        <p:spPr>
-          <a:xfrm>
-            <a:off x="279400" y="907274"/>
-            <a:ext cx="8644466" cy="498920"/>
-          </a:xfrm>
-        </p:spPr>
-        <p:txBody>
-          <a:bodyPr/>
-          <a:lstStyle/>
-          <a:p>
-            <a:r>
-              <a:rPr lang="en-US" dirty="0"/>
-              <a:t>Suppose you have a small alignment in PHYLIP format</a:t>
-            </a:r>
-            <a:endParaRPr lang="fr-FR" dirty="0"/>
-          </a:p>
-        </p:txBody>
-      </p:sp>
-      <p:sp>
-        <p:nvSpPr>
-          <p:cNvPr id="4" name="Espace réservé de la date 3"/>
-          <p:cNvSpPr>
-            <a:spLocks noGrp="1"/>
-          </p:cNvSpPr>
-          <p:nvPr>
-            <p:ph type="dt" sz="half" idx="10"/>
-          </p:nvPr>
-        </p:nvSpPr>
-        <p:spPr/>
-        <p:txBody>
-          <a:bodyPr/>
-          <a:lstStyle/>
-          <a:p>
-            <a:fld id="{751463B9-2A29-154C-A5AC-383AEA094CA9}" type="datetime1">
-              <a:rPr lang="fr-FR" smtClean="0"/>
-              <a:t>06/11/16</a:t>
-            </a:fld>
-            <a:endParaRPr lang="fr-FR" dirty="0"/>
-          </a:p>
-        </p:txBody>
-      </p:sp>
-      <p:sp>
-        <p:nvSpPr>
-          <p:cNvPr id="5" name="Espace réservé du pied de page 4"/>
-          <p:cNvSpPr>
-            <a:spLocks noGrp="1"/>
-          </p:cNvSpPr>
-          <p:nvPr>
-            <p:ph type="ftr" sz="quarter" idx="11"/>
-          </p:nvPr>
-        </p:nvSpPr>
-        <p:spPr/>
-        <p:txBody>
-          <a:bodyPr/>
-          <a:lstStyle/>
-          <a:p>
-            <a:r>
-              <a:rPr lang="fr-FR" smtClean="0"/>
-              <a:t>Python pour la biologie</a:t>
-            </a:r>
-            <a:endParaRPr lang="fr-FR" dirty="0"/>
-          </a:p>
-        </p:txBody>
-      </p:sp>
-      <p:sp>
-        <p:nvSpPr>
-          <p:cNvPr id="6" name="Espace réservé du numéro de diapositive 5"/>
-          <p:cNvSpPr>
-            <a:spLocks noGrp="1"/>
-          </p:cNvSpPr>
-          <p:nvPr>
-            <p:ph type="sldNum" sz="quarter" idx="12"/>
-          </p:nvPr>
-        </p:nvSpPr>
-        <p:spPr/>
-        <p:txBody>
-          <a:bodyPr/>
-          <a:lstStyle/>
-          <a:p>
-            <a:fld id="{DCE37727-CC04-7A46-938D-2CCFF056F773}" type="slidenum">
-              <a:rPr lang="fr-FR" smtClean="0"/>
-              <a:pPr/>
-              <a:t>9</a:t>
-            </a:fld>
-            <a:endParaRPr lang="fr-FR" dirty="0"/>
-          </a:p>
-        </p:txBody>
-      </p:sp>
-      <p:sp>
-        <p:nvSpPr>
-          <p:cNvPr id="7" name="ZoneTexte 6"/>
-          <p:cNvSpPr txBox="1"/>
-          <p:nvPr/>
-        </p:nvSpPr>
-        <p:spPr>
-          <a:xfrm>
-            <a:off x="279400" y="1383514"/>
-            <a:ext cx="8644466" cy="1107996"/>
-          </a:xfrm>
-          <a:prstGeom prst="rect">
-            <a:avLst/>
-          </a:prstGeom>
-          <a:solidFill>
-            <a:schemeClr val="accent2">
-              <a:lumMod val="60000"/>
-              <a:lumOff val="40000"/>
-            </a:schemeClr>
-          </a:solidFill>
-          <a:ln>
-            <a:noFill/>
-          </a:ln>
-        </p:spPr>
-        <p:txBody>
-          <a:bodyPr wrap="square" rtlCol="0">
-            <a:spAutoFit/>
-          </a:bodyPr>
-          <a:lstStyle>
-            <a:defPPr>
-              <a:defRPr lang="fr-FR"/>
-            </a:defPPr>
-            <a:lvl1pPr>
-              <a:defRPr sz="1400"/>
-            </a:lvl1pPr>
-          </a:lstStyle>
-          <a:p>
-            <a:r>
-              <a:rPr lang="nl-NL" sz="1100" dirty="0"/>
-              <a:t>5 6</a:t>
-            </a:r>
-          </a:p>
-          <a:p>
-            <a:r>
-              <a:rPr lang="nl-NL" sz="1100" dirty="0" err="1"/>
-              <a:t>Alpha</a:t>
-            </a:r>
-            <a:r>
-              <a:rPr lang="nl-NL" sz="1100" dirty="0"/>
-              <a:t> AACAAC</a:t>
-            </a:r>
-          </a:p>
-          <a:p>
-            <a:r>
-              <a:rPr lang="nl-NL" sz="1100" dirty="0" err="1"/>
-              <a:t>Beta</a:t>
-            </a:r>
-            <a:r>
-              <a:rPr lang="nl-NL" sz="1100" dirty="0"/>
-              <a:t> AACCCC</a:t>
-            </a:r>
-          </a:p>
-          <a:p>
-            <a:r>
-              <a:rPr lang="nl-NL" sz="1100" dirty="0"/>
-              <a:t>Gamma ACCAAC</a:t>
-            </a:r>
-          </a:p>
-          <a:p>
-            <a:r>
-              <a:rPr lang="nl-NL" sz="1100" dirty="0"/>
-              <a:t>Delta CCACCA</a:t>
-            </a:r>
-          </a:p>
-          <a:p>
-            <a:r>
-              <a:rPr lang="nl-NL" sz="1100" dirty="0"/>
-              <a:t>Epsilon CCAAAC</a:t>
-            </a:r>
-          </a:p>
-        </p:txBody>
-      </p:sp>
-      <p:sp>
-        <p:nvSpPr>
-          <p:cNvPr id="9" name="ZoneTexte 8"/>
-          <p:cNvSpPr txBox="1"/>
-          <p:nvPr/>
-        </p:nvSpPr>
-        <p:spPr>
-          <a:xfrm>
-            <a:off x="279400" y="3668634"/>
-            <a:ext cx="8644466" cy="2970043"/>
-          </a:xfrm>
-          <a:prstGeom prst="rect">
-            <a:avLst/>
-          </a:prstGeom>
-          <a:solidFill>
-            <a:schemeClr val="accent2">
-              <a:lumMod val="60000"/>
-              <a:lumOff val="40000"/>
-            </a:schemeClr>
-          </a:solidFill>
-          <a:ln>
-            <a:noFill/>
-          </a:ln>
-        </p:spPr>
-        <p:txBody>
-          <a:bodyPr wrap="square" rtlCol="0">
-            <a:spAutoFit/>
-          </a:bodyPr>
-          <a:lstStyle>
-            <a:defPPr>
-              <a:defRPr lang="fr-FR"/>
-            </a:defPPr>
-            <a:lvl1pPr>
-              <a:defRPr sz="1400"/>
-            </a:lvl1pPr>
-          </a:lstStyle>
-          <a:p>
-            <a:r>
-              <a:rPr lang="en-US" sz="1100" dirty="0"/>
-              <a:t>5 6</a:t>
-            </a:r>
-          </a:p>
-          <a:p>
-            <a:r>
-              <a:rPr lang="en-US" sz="1100" dirty="0"/>
-              <a:t>Alpha AAACCA</a:t>
-            </a:r>
-          </a:p>
-          <a:p>
-            <a:r>
-              <a:rPr lang="en-US" sz="1100" dirty="0"/>
-              <a:t>Beta AAACCC</a:t>
-            </a:r>
-          </a:p>
-          <a:p>
-            <a:r>
-              <a:rPr lang="en-US" sz="1100" dirty="0"/>
-              <a:t>Gamma ACCCCA</a:t>
-            </a:r>
-          </a:p>
-          <a:p>
-            <a:r>
-              <a:rPr lang="en-US" sz="1100" dirty="0"/>
-              <a:t>Delta CCCAAC</a:t>
-            </a:r>
-          </a:p>
-          <a:p>
-            <a:r>
-              <a:rPr lang="en-US" sz="1100" dirty="0"/>
-              <a:t>Epsilon CCCAAA</a:t>
-            </a:r>
-          </a:p>
-          <a:p>
-            <a:r>
-              <a:rPr lang="en-US" sz="1100" dirty="0"/>
-              <a:t>5 6</a:t>
-            </a:r>
-          </a:p>
-          <a:p>
-            <a:r>
-              <a:rPr lang="en-US" sz="1100" dirty="0"/>
-              <a:t>Alpha AAACAA</a:t>
-            </a:r>
-          </a:p>
-          <a:p>
-            <a:r>
-              <a:rPr lang="en-US" sz="1100" dirty="0"/>
-              <a:t>Beta AAACCC</a:t>
-            </a:r>
-          </a:p>
-          <a:p>
-            <a:r>
-              <a:rPr lang="en-US" sz="1100" dirty="0"/>
-              <a:t>Gamma ACCCAA</a:t>
-            </a:r>
-          </a:p>
-          <a:p>
-            <a:r>
-              <a:rPr lang="en-US" sz="1100" dirty="0"/>
-              <a:t>Delta CCCACC</a:t>
-            </a:r>
-          </a:p>
-          <a:p>
-            <a:r>
-              <a:rPr lang="en-US" sz="1100" dirty="0"/>
-              <a:t>Epsilon CCCAAA</a:t>
-            </a:r>
-          </a:p>
-          <a:p>
-            <a:r>
-              <a:rPr lang="en-US" sz="1100" dirty="0"/>
-              <a:t>5 6</a:t>
-            </a:r>
-          </a:p>
-          <a:p>
-            <a:r>
-              <a:rPr lang="en-US" sz="1100" dirty="0"/>
-              <a:t>Alpha AAAAAC</a:t>
-            </a:r>
-          </a:p>
-          <a:p>
-            <a:r>
-              <a:rPr lang="en-US" sz="1100" dirty="0"/>
-              <a:t>Beta AAACCC</a:t>
-            </a:r>
-          </a:p>
-          <a:p>
-            <a:r>
-              <a:rPr lang="en-US" sz="1100" dirty="0"/>
-              <a:t>Gamma AACAAC</a:t>
-            </a:r>
-          </a:p>
-          <a:p>
-            <a:r>
-              <a:rPr lang="en-US" sz="1100" dirty="0"/>
-              <a:t>Delta CCCCCA</a:t>
-            </a:r>
-          </a:p>
-        </p:txBody>
-      </p:sp>
-      <p:sp>
-        <p:nvSpPr>
-          <p:cNvPr id="10" name="ZoneTexte 9"/>
-          <p:cNvSpPr txBox="1"/>
-          <p:nvPr/>
-        </p:nvSpPr>
-        <p:spPr>
-          <a:xfrm>
-            <a:off x="279401" y="2548606"/>
-            <a:ext cx="8644466" cy="1080266"/>
+            <a:off x="279401" y="2574293"/>
+            <a:ext cx="8644466" cy="769441"/>
           </a:xfrm>
           <a:prstGeom prst="rect">
             <a:avLst/>
@@ -10567,6 +11320,541 @@
           <a:p>
             <a:r>
               <a:rPr lang="en-US" dirty="0"/>
+              <a:t>no annotation nor database cross-references because these are not included in the </a:t>
+            </a:r>
+            <a:r>
+              <a:rPr lang="en-US" dirty="0" smtClean="0"/>
+              <a:t>FASTA file </a:t>
+            </a:r>
+            <a:r>
+              <a:rPr lang="en-US" dirty="0"/>
+              <a:t>format</a:t>
+            </a:r>
+          </a:p>
+        </p:txBody>
+      </p:sp>
+    </p:spTree>
+    <p:extLst>
+      <p:ext uri="{BB962C8B-B14F-4D97-AF65-F5344CB8AC3E}">
+        <p14:creationId xmlns:p14="http://schemas.microsoft.com/office/powerpoint/2010/main" val="843041792"/>
+      </p:ext>
+    </p:extLst>
+  </p:cSld>
+  <p:clrMapOvr>
+    <a:masterClrMapping/>
+  </p:clrMapOvr>
+</p:sld>
+</file>
+
+<file path=ppt/slides/slide9.xml><?xml version="1.0" encoding="utf-8"?>
+<p:sld xmlns:a="http://schemas.openxmlformats.org/drawingml/2006/main" xmlns:r="http://schemas.openxmlformats.org/officeDocument/2006/relationships" xmlns:p="http://schemas.openxmlformats.org/presentationml/2006/main">
+  <p:cSld>
+    <p:spTree>
+      <p:nvGrpSpPr>
+        <p:cNvPr id="1" name=""/>
+        <p:cNvGrpSpPr/>
+        <p:nvPr/>
+      </p:nvGrpSpPr>
+      <p:grpSpPr>
+        <a:xfrm>
+          <a:off x="0" y="0"/>
+          <a:ext cx="0" cy="0"/>
+          <a:chOff x="0" y="0"/>
+          <a:chExt cx="0" cy="0"/>
+        </a:xfrm>
+      </p:grpSpPr>
+      <p:sp>
+        <p:nvSpPr>
+          <p:cNvPr id="2" name="Titre 1"/>
+          <p:cNvSpPr>
+            <a:spLocks noGrp="1"/>
+          </p:cNvSpPr>
+          <p:nvPr>
+            <p:ph type="title"/>
+          </p:nvPr>
+        </p:nvSpPr>
+        <p:spPr/>
+        <p:txBody>
+          <a:bodyPr/>
+          <a:lstStyle/>
+          <a:p>
+            <a:r>
+              <a:rPr lang="fr-FR" dirty="0" smtClean="0"/>
+              <a:t>Multiple </a:t>
+            </a:r>
+            <a:r>
+              <a:rPr lang="fr-FR" dirty="0" err="1" smtClean="0"/>
+              <a:t>alignments</a:t>
+            </a:r>
+            <a:endParaRPr lang="fr-FR" dirty="0"/>
+          </a:p>
+        </p:txBody>
+      </p:sp>
+      <p:sp>
+        <p:nvSpPr>
+          <p:cNvPr id="3" name="Espace réservé du contenu 2"/>
+          <p:cNvSpPr>
+            <a:spLocks noGrp="1"/>
+          </p:cNvSpPr>
+          <p:nvPr>
+            <p:ph idx="1"/>
+          </p:nvPr>
+        </p:nvSpPr>
+        <p:spPr>
+          <a:xfrm>
+            <a:off x="279400" y="907274"/>
+            <a:ext cx="8644466" cy="498920"/>
+          </a:xfrm>
+        </p:spPr>
+        <p:txBody>
+          <a:bodyPr/>
+          <a:lstStyle/>
+          <a:p>
+            <a:r>
+              <a:rPr lang="en-US" dirty="0"/>
+              <a:t>Suppose you have a small alignment in PHYLIP format</a:t>
+            </a:r>
+            <a:endParaRPr lang="fr-FR" dirty="0"/>
+          </a:p>
+        </p:txBody>
+      </p:sp>
+      <p:sp>
+        <p:nvSpPr>
+          <p:cNvPr id="4" name="Espace réservé de la date 3"/>
+          <p:cNvSpPr>
+            <a:spLocks noGrp="1"/>
+          </p:cNvSpPr>
+          <p:nvPr>
+            <p:ph type="dt" sz="half" idx="10"/>
+          </p:nvPr>
+        </p:nvSpPr>
+        <p:spPr/>
+        <p:txBody>
+          <a:bodyPr/>
+          <a:lstStyle/>
+          <a:p>
+            <a:fld id="{751463B9-2A29-154C-A5AC-383AEA094CA9}" type="datetime1">
+              <a:rPr lang="fr-FR" smtClean="0"/>
+              <a:t>08/11/16</a:t>
+            </a:fld>
+            <a:endParaRPr lang="fr-FR" dirty="0"/>
+          </a:p>
+        </p:txBody>
+      </p:sp>
+      <p:sp>
+        <p:nvSpPr>
+          <p:cNvPr id="5" name="Espace réservé du pied de page 4"/>
+          <p:cNvSpPr>
+            <a:spLocks noGrp="1"/>
+          </p:cNvSpPr>
+          <p:nvPr>
+            <p:ph type="ftr" sz="quarter" idx="11"/>
+          </p:nvPr>
+        </p:nvSpPr>
+        <p:spPr/>
+        <p:txBody>
+          <a:bodyPr/>
+          <a:lstStyle/>
+          <a:p>
+            <a:r>
+              <a:rPr lang="fr-FR" smtClean="0"/>
+              <a:t>Python pour la biologie</a:t>
+            </a:r>
+            <a:endParaRPr lang="fr-FR" dirty="0"/>
+          </a:p>
+        </p:txBody>
+      </p:sp>
+      <p:sp>
+        <p:nvSpPr>
+          <p:cNvPr id="6" name="Espace réservé du numéro de diapositive 5"/>
+          <p:cNvSpPr>
+            <a:spLocks noGrp="1"/>
+          </p:cNvSpPr>
+          <p:nvPr>
+            <p:ph type="sldNum" sz="quarter" idx="12"/>
+          </p:nvPr>
+        </p:nvSpPr>
+        <p:spPr/>
+        <p:txBody>
+          <a:bodyPr/>
+          <a:lstStyle/>
+          <a:p>
+            <a:fld id="{DCE37727-CC04-7A46-938D-2CCFF056F773}" type="slidenum">
+              <a:rPr lang="fr-FR" smtClean="0"/>
+              <a:pPr/>
+              <a:t>9</a:t>
+            </a:fld>
+            <a:endParaRPr lang="fr-FR" dirty="0"/>
+          </a:p>
+        </p:txBody>
+      </p:sp>
+      <p:sp>
+        <p:nvSpPr>
+          <p:cNvPr id="7" name="ZoneTexte 6"/>
+          <p:cNvSpPr txBox="1"/>
+          <p:nvPr/>
+        </p:nvSpPr>
+        <p:spPr>
+          <a:xfrm>
+            <a:off x="279400" y="1383514"/>
+            <a:ext cx="8644466" cy="1107996"/>
+          </a:xfrm>
+          <a:prstGeom prst="rect">
+            <a:avLst/>
+          </a:prstGeom>
+          <a:solidFill>
+            <a:schemeClr val="accent2">
+              <a:lumMod val="60000"/>
+              <a:lumOff val="40000"/>
+            </a:schemeClr>
+          </a:solidFill>
+          <a:ln>
+            <a:noFill/>
+          </a:ln>
+        </p:spPr>
+        <p:txBody>
+          <a:bodyPr wrap="square" rtlCol="0">
+            <a:spAutoFit/>
+          </a:bodyPr>
+          <a:lstStyle>
+            <a:defPPr>
+              <a:defRPr lang="fr-FR"/>
+            </a:defPPr>
+            <a:lvl1pPr>
+              <a:defRPr sz="1400"/>
+            </a:lvl1pPr>
+          </a:lstStyle>
+          <a:p>
+            <a:r>
+              <a:rPr lang="nl-NL" sz="1100" dirty="0"/>
+              <a:t>5 6</a:t>
+            </a:r>
+          </a:p>
+          <a:p>
+            <a:r>
+              <a:rPr lang="nl-NL" sz="1100" dirty="0" err="1"/>
+              <a:t>Alpha</a:t>
+            </a:r>
+            <a:r>
+              <a:rPr lang="nl-NL" sz="1100" dirty="0"/>
+              <a:t> AACAAC</a:t>
+            </a:r>
+          </a:p>
+          <a:p>
+            <a:r>
+              <a:rPr lang="nl-NL" sz="1100" dirty="0" err="1"/>
+              <a:t>Beta</a:t>
+            </a:r>
+            <a:r>
+              <a:rPr lang="nl-NL" sz="1100" dirty="0"/>
+              <a:t> AACCCC</a:t>
+            </a:r>
+          </a:p>
+          <a:p>
+            <a:r>
+              <a:rPr lang="nl-NL" sz="1100" dirty="0"/>
+              <a:t>Gamma ACCAAC</a:t>
+            </a:r>
+          </a:p>
+          <a:p>
+            <a:r>
+              <a:rPr lang="nl-NL" sz="1100" dirty="0"/>
+              <a:t>Delta CCACCA</a:t>
+            </a:r>
+          </a:p>
+          <a:p>
+            <a:r>
+              <a:rPr lang="nl-NL" sz="1100" dirty="0"/>
+              <a:t>Epsilon CCAAAC</a:t>
+            </a:r>
+          </a:p>
+        </p:txBody>
+      </p:sp>
+      <p:sp>
+        <p:nvSpPr>
+          <p:cNvPr id="9" name="ZoneTexte 8"/>
+          <p:cNvSpPr txBox="1"/>
+          <p:nvPr/>
+        </p:nvSpPr>
+        <p:spPr>
+          <a:xfrm>
+            <a:off x="279400" y="3668634"/>
+            <a:ext cx="8644466" cy="2970043"/>
+          </a:xfrm>
+          <a:prstGeom prst="rect">
+            <a:avLst/>
+          </a:prstGeom>
+          <a:solidFill>
+            <a:schemeClr val="accent2">
+              <a:lumMod val="60000"/>
+              <a:lumOff val="40000"/>
+            </a:schemeClr>
+          </a:solidFill>
+          <a:ln>
+            <a:noFill/>
+          </a:ln>
+        </p:spPr>
+        <p:txBody>
+          <a:bodyPr wrap="square" rtlCol="0">
+            <a:spAutoFit/>
+          </a:bodyPr>
+          <a:lstStyle>
+            <a:defPPr>
+              <a:defRPr lang="fr-FR"/>
+            </a:defPPr>
+            <a:lvl1pPr>
+              <a:defRPr sz="1400"/>
+            </a:lvl1pPr>
+          </a:lstStyle>
+          <a:p>
+            <a:r>
+              <a:rPr lang="en-US" sz="1100" dirty="0"/>
+              <a:t>5 6</a:t>
+            </a:r>
+          </a:p>
+          <a:p>
+            <a:r>
+              <a:rPr lang="en-US" sz="1100" dirty="0"/>
+              <a:t>Alpha AAACCA</a:t>
+            </a:r>
+          </a:p>
+          <a:p>
+            <a:r>
+              <a:rPr lang="en-US" sz="1100" dirty="0"/>
+              <a:t>Beta AAACCC</a:t>
+            </a:r>
+          </a:p>
+          <a:p>
+            <a:r>
+              <a:rPr lang="en-US" sz="1100" dirty="0"/>
+              <a:t>Gamma ACCCCA</a:t>
+            </a:r>
+          </a:p>
+          <a:p>
+            <a:r>
+              <a:rPr lang="en-US" sz="1100" dirty="0"/>
+              <a:t>Delta CCCAAC</a:t>
+            </a:r>
+          </a:p>
+          <a:p>
+            <a:r>
+              <a:rPr lang="en-US" sz="1100" dirty="0"/>
+              <a:t>Epsilon CCCAAA</a:t>
+            </a:r>
+          </a:p>
+          <a:p>
+            <a:r>
+              <a:rPr lang="en-US" sz="1100" dirty="0"/>
+              <a:t>5 6</a:t>
+            </a:r>
+          </a:p>
+          <a:p>
+            <a:r>
+              <a:rPr lang="en-US" sz="1100" dirty="0"/>
+              <a:t>Alpha AAACAA</a:t>
+            </a:r>
+          </a:p>
+          <a:p>
+            <a:r>
+              <a:rPr lang="en-US" sz="1100" dirty="0"/>
+              <a:t>Beta AAACCC</a:t>
+            </a:r>
+          </a:p>
+          <a:p>
+            <a:r>
+              <a:rPr lang="en-US" sz="1100" dirty="0"/>
+              <a:t>Gamma ACCCAA</a:t>
+            </a:r>
+          </a:p>
+          <a:p>
+            <a:r>
+              <a:rPr lang="en-US" sz="1100" dirty="0"/>
+              <a:t>Delta CCCACC</a:t>
+            </a:r>
+          </a:p>
+          <a:p>
+            <a:r>
+              <a:rPr lang="en-US" sz="1100" dirty="0"/>
+              <a:t>Epsilon CCCAAA</a:t>
+            </a:r>
+          </a:p>
+          <a:p>
+            <a:r>
+              <a:rPr lang="en-US" sz="1100" dirty="0"/>
+              <a:t>5 6</a:t>
+            </a:r>
+          </a:p>
+          <a:p>
+            <a:r>
+              <a:rPr lang="en-US" sz="1100" dirty="0"/>
+              <a:t>Alpha AAAAAC</a:t>
+            </a:r>
+          </a:p>
+          <a:p>
+            <a:r>
+              <a:rPr lang="en-US" sz="1100" dirty="0"/>
+              <a:t>Beta AAACCC</a:t>
+            </a:r>
+          </a:p>
+          <a:p>
+            <a:r>
+              <a:rPr lang="en-US" sz="1100" dirty="0"/>
+              <a:t>Gamma AACAAC</a:t>
+            </a:r>
+          </a:p>
+          <a:p>
+            <a:r>
+              <a:rPr lang="en-US" sz="1100" dirty="0"/>
+              <a:t>Delta CCCCCA</a:t>
+            </a:r>
+          </a:p>
+        </p:txBody>
+      </p:sp>
+      <p:sp>
+        <p:nvSpPr>
+          <p:cNvPr id="10" name="ZoneTexte 9"/>
+          <p:cNvSpPr txBox="1"/>
+          <p:nvPr/>
+        </p:nvSpPr>
+        <p:spPr>
+          <a:xfrm>
+            <a:off x="279401" y="2548606"/>
+            <a:ext cx="8644466" cy="1080266"/>
+          </a:xfrm>
+          <a:prstGeom prst="rect">
+            <a:avLst/>
+          </a:prstGeom>
+        </p:spPr>
+        <p:txBody>
+          <a:bodyPr vert="horz" lIns="91440" tIns="45720" rIns="91440" bIns="45720" rtlCol="0">
+            <a:noAutofit/>
+          </a:bodyPr>
+          <a:lstStyle>
+            <a:lvl1pPr marL="342900" marR="0" indent="-342900" fontAlgn="auto">
+              <a:lnSpc>
+                <a:spcPct val="100000"/>
+              </a:lnSpc>
+              <a:spcBef>
+                <a:spcPct val="20000"/>
+              </a:spcBef>
+              <a:spcAft>
+                <a:spcPts val="0"/>
+              </a:spcAft>
+              <a:buClr>
+                <a:schemeClr val="accent6"/>
+              </a:buClr>
+              <a:buSzTx/>
+              <a:buFont typeface="Lucida Grande"/>
+              <a:buChar char="➔"/>
+              <a:tabLst/>
+              <a:defRPr sz="2000"/>
+            </a:lvl1pPr>
+            <a:lvl2pPr marL="742950" marR="0" indent="-285750" fontAlgn="auto">
+              <a:lnSpc>
+                <a:spcPct val="100000"/>
+              </a:lnSpc>
+              <a:spcBef>
+                <a:spcPct val="20000"/>
+              </a:spcBef>
+              <a:spcAft>
+                <a:spcPts val="0"/>
+              </a:spcAft>
+              <a:buClr>
+                <a:srgbClr val="009DE0"/>
+              </a:buClr>
+              <a:buSzTx/>
+              <a:buFont typeface="Arial"/>
+              <a:buChar char="›"/>
+              <a:tabLst/>
+              <a:defRPr sz="2800"/>
+            </a:lvl2pPr>
+            <a:lvl3pPr marL="1143000" marR="0" indent="-228600" fontAlgn="auto">
+              <a:lnSpc>
+                <a:spcPct val="100000"/>
+              </a:lnSpc>
+              <a:spcBef>
+                <a:spcPct val="20000"/>
+              </a:spcBef>
+              <a:spcAft>
+                <a:spcPts val="0"/>
+              </a:spcAft>
+              <a:buClrTx/>
+              <a:buSzTx/>
+              <a:buFont typeface="Arial"/>
+              <a:buChar char="•"/>
+              <a:tabLst/>
+              <a:defRPr sz="2400"/>
+            </a:lvl3pPr>
+            <a:lvl4pPr marL="1600200" marR="0" indent="-228600" fontAlgn="auto">
+              <a:lnSpc>
+                <a:spcPct val="100000"/>
+              </a:lnSpc>
+              <a:spcBef>
+                <a:spcPct val="20000"/>
+              </a:spcBef>
+              <a:spcAft>
+                <a:spcPts val="0"/>
+              </a:spcAft>
+              <a:buClrTx/>
+              <a:buSzTx/>
+              <a:buFont typeface="Arial"/>
+              <a:buChar char="–"/>
+              <a:tabLst/>
+              <a:defRPr sz="2000"/>
+            </a:lvl4pPr>
+            <a:lvl5pPr marL="2057400" marR="0" indent="-228600" fontAlgn="auto">
+              <a:lnSpc>
+                <a:spcPct val="100000"/>
+              </a:lnSpc>
+              <a:spcBef>
+                <a:spcPct val="20000"/>
+              </a:spcBef>
+              <a:spcAft>
+                <a:spcPts val="0"/>
+              </a:spcAft>
+              <a:buClrTx/>
+              <a:buSzTx/>
+              <a:buFont typeface="Arial"/>
+              <a:buChar char="»"/>
+              <a:tabLst/>
+              <a:defRPr sz="2000"/>
+            </a:lvl5pPr>
+            <a:lvl6pPr marL="2514600" indent="-228600">
+              <a:spcBef>
+                <a:spcPct val="20000"/>
+              </a:spcBef>
+              <a:buFont typeface="Arial"/>
+              <a:buChar char="•"/>
+              <a:defRPr sz="2000"/>
+            </a:lvl6pPr>
+            <a:lvl7pPr marL="2971800" indent="-228600">
+              <a:spcBef>
+                <a:spcPct val="20000"/>
+              </a:spcBef>
+              <a:buFont typeface="Arial"/>
+              <a:buChar char="•"/>
+              <a:defRPr sz="2000"/>
+            </a:lvl7pPr>
+            <a:lvl8pPr marL="3429000" indent="-228600">
+              <a:spcBef>
+                <a:spcPct val="20000"/>
+              </a:spcBef>
+              <a:buFont typeface="Arial"/>
+              <a:buChar char="•"/>
+              <a:defRPr sz="2000"/>
+            </a:lvl8pPr>
+            <a:lvl9pPr marL="3886200" indent="-228600">
+              <a:spcBef>
+                <a:spcPct val="20000"/>
+              </a:spcBef>
+              <a:buFont typeface="Arial"/>
+              <a:buChar char="•"/>
+              <a:defRPr sz="2000"/>
+            </a:lvl9pPr>
+          </a:lstStyle>
+          <a:p>
+            <a:r>
+              <a:rPr lang="en-US" dirty="0"/>
               <a:t>T</a:t>
             </a:r>
             <a:r>
@@ -10617,13 +11905,8 @@
             </a:r>
             <a:r>
               <a:rPr lang="en-US" dirty="0"/>
-              <a:t>for conciseness</a:t>
-            </a:r>
-            <a:r>
-              <a:rPr lang="en-US" dirty="0"/>
-              <a:t>:</a:t>
-            </a:r>
-            <a:endParaRPr lang="en-US" dirty="0"/>
+              <a:t>for conciseness:</a:t>
+            </a:r>
           </a:p>
         </p:txBody>
       </p:sp>

</xml_diff>